<commit_message>
Update Attendance using Facial Recognition.pptx
</commit_message>
<xml_diff>
--- a/Attendance using Facial Recognition.pptx
+++ b/Attendance using Facial Recognition.pptx
@@ -6,7 +6,11 @@
   </p:sldMasterIdLst>
   <p:sldIdLst>
     <p:sldId id="256" r:id="rId2"/>
-    <p:sldId id="257" r:id="rId3"/>
+    <p:sldId id="260" r:id="rId3"/>
+    <p:sldId id="261" r:id="rId4"/>
+    <p:sldId id="257" r:id="rId5"/>
+    <p:sldId id="258" r:id="rId6"/>
+    <p:sldId id="259" r:id="rId7"/>
   </p:sldIdLst>
   <p:sldSz cx="12192000" cy="6858000"/>
   <p:notesSz cx="6858000" cy="9144000"/>
@@ -105,6 +109,11 @@
       </a:defRPr>
     </a:lvl9pPr>
   </p:defaultTextStyle>
+  <p:extLst>
+    <p:ext uri="{EFAFB233-063F-42B5-8137-9DF3F51BA10A}">
+      <p15:sldGuideLst xmlns:p15="http://schemas.microsoft.com/office/powerpoint/2012/main"/>
+    </p:ext>
+  </p:extLst>
 </p:presentation>
 </file>
 
@@ -158,7 +167,7 @@
           <a:noFill/>
           <a:extLst>
             <a:ext uri="{909E8E84-426E-40dd-AFC4-6F175D3DCCD1}">
-              <a14:hiddenFill xmlns:a14="http://schemas.microsoft.com/office/drawing/2010/main" xmlns="">
+              <a14:hiddenFill xmlns="" xmlns:a14="http://schemas.microsoft.com/office/drawing/2010/main">
                 <a:solidFill>
                   <a:srgbClr val="FFFFFF"/>
                 </a:solidFill>
@@ -218,7 +227,7 @@
             </a:ln>
             <a:extLst>
               <a:ext uri="{91240B29-F687-4f45-9708-019B960494DF}">
-                <a14:hiddenLine xmlns:a14="http://schemas.microsoft.com/office/drawing/2010/main" xmlns="" w="9525">
+                <a14:hiddenLine xmlns="" xmlns:a14="http://schemas.microsoft.com/office/drawing/2010/main" w="9525">
                   <a:solidFill>
                     <a:srgbClr val="000000"/>
                   </a:solidFill>
@@ -308,7 +317,7 @@
             </a:ln>
             <a:extLst>
               <a:ext uri="{91240B29-F687-4f45-9708-019B960494DF}">
-                <a14:hiddenLine xmlns:a14="http://schemas.microsoft.com/office/drawing/2010/main" xmlns="" w="9525">
+                <a14:hiddenLine xmlns="" xmlns:a14="http://schemas.microsoft.com/office/drawing/2010/main" w="9525">
                   <a:solidFill>
                     <a:srgbClr val="000000"/>
                   </a:solidFill>
@@ -398,7 +407,7 @@
             </a:ln>
             <a:extLst>
               <a:ext uri="{91240B29-F687-4f45-9708-019B960494DF}">
-                <a14:hiddenLine xmlns:a14="http://schemas.microsoft.com/office/drawing/2010/main" xmlns="" w="9525">
+                <a14:hiddenLine xmlns="" xmlns:a14="http://schemas.microsoft.com/office/drawing/2010/main" w="9525">
                   <a:solidFill>
                     <a:srgbClr val="000000"/>
                   </a:solidFill>
@@ -432,7 +441,7 @@
             </a:ln>
             <a:extLst>
               <a:ext uri="{91240B29-F687-4f45-9708-019B960494DF}">
-                <a14:hiddenLine xmlns:a14="http://schemas.microsoft.com/office/drawing/2010/main" xmlns="" w="9525">
+                <a14:hiddenLine xmlns="" xmlns:a14="http://schemas.microsoft.com/office/drawing/2010/main" w="9525">
                   <a:solidFill>
                     <a:srgbClr val="000000"/>
                   </a:solidFill>
@@ -522,7 +531,7 @@
             </a:ln>
             <a:extLst>
               <a:ext uri="{91240B29-F687-4f45-9708-019B960494DF}">
-                <a14:hiddenLine xmlns:a14="http://schemas.microsoft.com/office/drawing/2010/main" xmlns="" w="9525">
+                <a14:hiddenLine xmlns="" xmlns:a14="http://schemas.microsoft.com/office/drawing/2010/main" w="9525">
                   <a:solidFill>
                     <a:srgbClr val="000000"/>
                   </a:solidFill>
@@ -584,7 +593,7 @@
             </a:ln>
             <a:extLst>
               <a:ext uri="{91240B29-F687-4f45-9708-019B960494DF}">
-                <a14:hiddenLine xmlns:a14="http://schemas.microsoft.com/office/drawing/2010/main" xmlns="" w="9525">
+                <a14:hiddenLine xmlns="" xmlns:a14="http://schemas.microsoft.com/office/drawing/2010/main" w="9525">
                   <a:solidFill>
                     <a:srgbClr val="000000"/>
                   </a:solidFill>
@@ -646,7 +655,7 @@
             </a:ln>
             <a:extLst>
               <a:ext uri="{91240B29-F687-4f45-9708-019B960494DF}">
-                <a14:hiddenLine xmlns:a14="http://schemas.microsoft.com/office/drawing/2010/main" xmlns="" w="9525">
+                <a14:hiddenLine xmlns="" xmlns:a14="http://schemas.microsoft.com/office/drawing/2010/main" w="9525">
                   <a:solidFill>
                     <a:srgbClr val="000000"/>
                   </a:solidFill>
@@ -736,7 +745,7 @@
             </a:ln>
             <a:extLst>
               <a:ext uri="{91240B29-F687-4f45-9708-019B960494DF}">
-                <a14:hiddenLine xmlns:a14="http://schemas.microsoft.com/office/drawing/2010/main" xmlns="" w="9525">
+                <a14:hiddenLine xmlns="" xmlns:a14="http://schemas.microsoft.com/office/drawing/2010/main" w="9525">
                   <a:solidFill>
                     <a:srgbClr val="000000"/>
                   </a:solidFill>
@@ -798,7 +807,7 @@
             </a:ln>
             <a:extLst>
               <a:ext uri="{91240B29-F687-4f45-9708-019B960494DF}">
-                <a14:hiddenLine xmlns:a14="http://schemas.microsoft.com/office/drawing/2010/main" xmlns="" w="9525">
+                <a14:hiddenLine xmlns="" xmlns:a14="http://schemas.microsoft.com/office/drawing/2010/main" w="9525">
                   <a:solidFill>
                     <a:srgbClr val="000000"/>
                   </a:solidFill>
@@ -860,7 +869,7 @@
             </a:ln>
             <a:extLst>
               <a:ext uri="{91240B29-F687-4f45-9708-019B960494DF}">
-                <a14:hiddenLine xmlns:a14="http://schemas.microsoft.com/office/drawing/2010/main" xmlns="" w="9525">
+                <a14:hiddenLine xmlns="" xmlns:a14="http://schemas.microsoft.com/office/drawing/2010/main" w="9525">
                   <a:solidFill>
                     <a:srgbClr val="000000"/>
                   </a:solidFill>
@@ -950,7 +959,7 @@
             </a:ln>
             <a:extLst>
               <a:ext uri="{91240B29-F687-4f45-9708-019B960494DF}">
-                <a14:hiddenLine xmlns:a14="http://schemas.microsoft.com/office/drawing/2010/main" xmlns="" w="9525">
+                <a14:hiddenLine xmlns="" xmlns:a14="http://schemas.microsoft.com/office/drawing/2010/main" w="9525">
                   <a:solidFill>
                     <a:srgbClr val="000000"/>
                   </a:solidFill>
@@ -1040,7 +1049,7 @@
             </a:ln>
             <a:extLst>
               <a:ext uri="{91240B29-F687-4f45-9708-019B960494DF}">
-                <a14:hiddenLine xmlns:a14="http://schemas.microsoft.com/office/drawing/2010/main" xmlns="" w="9525">
+                <a14:hiddenLine xmlns="" xmlns:a14="http://schemas.microsoft.com/office/drawing/2010/main" w="9525">
                   <a:solidFill>
                     <a:srgbClr val="000000"/>
                   </a:solidFill>
@@ -1102,7 +1111,7 @@
             </a:ln>
             <a:extLst>
               <a:ext uri="{91240B29-F687-4f45-9708-019B960494DF}">
-                <a14:hiddenLine xmlns:a14="http://schemas.microsoft.com/office/drawing/2010/main" xmlns="" w="9525">
+                <a14:hiddenLine xmlns="" xmlns:a14="http://schemas.microsoft.com/office/drawing/2010/main" w="9525">
                   <a:solidFill>
                     <a:srgbClr val="000000"/>
                   </a:solidFill>
@@ -1212,7 +1221,7 @@
             </a:ln>
             <a:extLst>
               <a:ext uri="{91240B29-F687-4f45-9708-019B960494DF}">
-                <a14:hiddenLine xmlns:a14="http://schemas.microsoft.com/office/drawing/2010/main" xmlns="" w="9525">
+                <a14:hiddenLine xmlns="" xmlns:a14="http://schemas.microsoft.com/office/drawing/2010/main" w="9525">
                   <a:solidFill>
                     <a:srgbClr val="000000"/>
                   </a:solidFill>
@@ -1274,7 +1283,7 @@
             </a:ln>
             <a:extLst>
               <a:ext uri="{91240B29-F687-4f45-9708-019B960494DF}">
-                <a14:hiddenLine xmlns:a14="http://schemas.microsoft.com/office/drawing/2010/main" xmlns="" w="9525">
+                <a14:hiddenLine xmlns="" xmlns:a14="http://schemas.microsoft.com/office/drawing/2010/main" w="9525">
                   <a:solidFill>
                     <a:srgbClr val="000000"/>
                   </a:solidFill>
@@ -1364,7 +1373,7 @@
             </a:ln>
             <a:extLst>
               <a:ext uri="{91240B29-F687-4f45-9708-019B960494DF}">
-                <a14:hiddenLine xmlns:a14="http://schemas.microsoft.com/office/drawing/2010/main" xmlns="" w="9525">
+                <a14:hiddenLine xmlns="" xmlns:a14="http://schemas.microsoft.com/office/drawing/2010/main" w="9525">
                   <a:solidFill>
                     <a:srgbClr val="000000"/>
                   </a:solidFill>
@@ -1454,7 +1463,7 @@
             </a:ln>
             <a:extLst>
               <a:ext uri="{91240B29-F687-4f45-9708-019B960494DF}">
-                <a14:hiddenLine xmlns:a14="http://schemas.microsoft.com/office/drawing/2010/main" xmlns="" w="9525">
+                <a14:hiddenLine xmlns="" xmlns:a14="http://schemas.microsoft.com/office/drawing/2010/main" w="9525">
                   <a:solidFill>
                     <a:srgbClr val="000000"/>
                   </a:solidFill>
@@ -1516,7 +1525,7 @@
             </a:ln>
             <a:extLst>
               <a:ext uri="{91240B29-F687-4f45-9708-019B960494DF}">
-                <a14:hiddenLine xmlns:a14="http://schemas.microsoft.com/office/drawing/2010/main" xmlns="" w="9525">
+                <a14:hiddenLine xmlns="" xmlns:a14="http://schemas.microsoft.com/office/drawing/2010/main" w="9525">
                   <a:solidFill>
                     <a:srgbClr val="000000"/>
                   </a:solidFill>
@@ -1606,7 +1615,7 @@
             </a:ln>
             <a:extLst>
               <a:ext uri="{91240B29-F687-4f45-9708-019B960494DF}">
-                <a14:hiddenLine xmlns:a14="http://schemas.microsoft.com/office/drawing/2010/main" xmlns="" w="9525">
+                <a14:hiddenLine xmlns="" xmlns:a14="http://schemas.microsoft.com/office/drawing/2010/main" w="9525">
                   <a:solidFill>
                     <a:srgbClr val="000000"/>
                   </a:solidFill>
@@ -1696,7 +1705,7 @@
             </a:ln>
             <a:extLst>
               <a:ext uri="{91240B29-F687-4f45-9708-019B960494DF}">
-                <a14:hiddenLine xmlns:a14="http://schemas.microsoft.com/office/drawing/2010/main" xmlns="" w="9525">
+                <a14:hiddenLine xmlns="" xmlns:a14="http://schemas.microsoft.com/office/drawing/2010/main" w="9525">
                   <a:solidFill>
                     <a:srgbClr val="000000"/>
                   </a:solidFill>
@@ -1752,7 +1761,7 @@
             </a:ln>
             <a:extLst>
               <a:ext uri="{91240B29-F687-4f45-9708-019B960494DF}">
-                <a14:hiddenLine xmlns:a14="http://schemas.microsoft.com/office/drawing/2010/main" xmlns="" w="9525">
+                <a14:hiddenLine xmlns="" xmlns:a14="http://schemas.microsoft.com/office/drawing/2010/main" w="9525">
                   <a:solidFill>
                     <a:srgbClr val="000000"/>
                   </a:solidFill>
@@ -1842,7 +1851,7 @@
             </a:ln>
             <a:extLst>
               <a:ext uri="{91240B29-F687-4f45-9708-019B960494DF}">
-                <a14:hiddenLine xmlns:a14="http://schemas.microsoft.com/office/drawing/2010/main" xmlns="" w="9525">
+                <a14:hiddenLine xmlns="" xmlns:a14="http://schemas.microsoft.com/office/drawing/2010/main" w="9525">
                   <a:solidFill>
                     <a:srgbClr val="000000"/>
                   </a:solidFill>
@@ -1898,7 +1907,7 @@
             </a:ln>
             <a:extLst>
               <a:ext uri="{91240B29-F687-4f45-9708-019B960494DF}">
-                <a14:hiddenLine xmlns:a14="http://schemas.microsoft.com/office/drawing/2010/main" xmlns="" w="9525">
+                <a14:hiddenLine xmlns="" xmlns:a14="http://schemas.microsoft.com/office/drawing/2010/main" w="9525">
                   <a:solidFill>
                     <a:srgbClr val="000000"/>
                   </a:solidFill>
@@ -1988,7 +1997,7 @@
             </a:ln>
             <a:extLst>
               <a:ext uri="{91240B29-F687-4f45-9708-019B960494DF}">
-                <a14:hiddenLine xmlns:a14="http://schemas.microsoft.com/office/drawing/2010/main" xmlns="" w="9525">
+                <a14:hiddenLine xmlns="" xmlns:a14="http://schemas.microsoft.com/office/drawing/2010/main" w="9525">
                   <a:solidFill>
                     <a:srgbClr val="000000"/>
                   </a:solidFill>
@@ -2056,7 +2065,7 @@
             </a:ln>
             <a:extLst>
               <a:ext uri="{91240B29-F687-4f45-9708-019B960494DF}">
-                <a14:hiddenLine xmlns:a14="http://schemas.microsoft.com/office/drawing/2010/main" xmlns="" w="9525">
+                <a14:hiddenLine xmlns="" xmlns:a14="http://schemas.microsoft.com/office/drawing/2010/main" w="9525">
                   <a:solidFill>
                     <a:srgbClr val="000000"/>
                   </a:solidFill>
@@ -2146,7 +2155,7 @@
             </a:ln>
             <a:extLst>
               <a:ext uri="{91240B29-F687-4f45-9708-019B960494DF}">
-                <a14:hiddenLine xmlns:a14="http://schemas.microsoft.com/office/drawing/2010/main" xmlns="" w="9525">
+                <a14:hiddenLine xmlns="" xmlns:a14="http://schemas.microsoft.com/office/drawing/2010/main" w="9525">
                   <a:solidFill>
                     <a:srgbClr val="000000"/>
                   </a:solidFill>
@@ -2214,7 +2223,7 @@
             </a:ln>
             <a:extLst>
               <a:ext uri="{91240B29-F687-4f45-9708-019B960494DF}">
-                <a14:hiddenLine xmlns:a14="http://schemas.microsoft.com/office/drawing/2010/main" xmlns="" w="9525">
+                <a14:hiddenLine xmlns="" xmlns:a14="http://schemas.microsoft.com/office/drawing/2010/main" w="9525">
                   <a:solidFill>
                     <a:srgbClr val="000000"/>
                   </a:solidFill>
@@ -2304,7 +2313,7 @@
             </a:ln>
             <a:extLst>
               <a:ext uri="{91240B29-F687-4f45-9708-019B960494DF}">
-                <a14:hiddenLine xmlns:a14="http://schemas.microsoft.com/office/drawing/2010/main" xmlns="" w="9525">
+                <a14:hiddenLine xmlns="" xmlns:a14="http://schemas.microsoft.com/office/drawing/2010/main" w="9525">
                   <a:solidFill>
                     <a:srgbClr val="000000"/>
                   </a:solidFill>
@@ -2338,7 +2347,7 @@
             </a:ln>
             <a:extLst>
               <a:ext uri="{91240B29-F687-4f45-9708-019B960494DF}">
-                <a14:hiddenLine xmlns:a14="http://schemas.microsoft.com/office/drawing/2010/main" xmlns="" w="9525">
+                <a14:hiddenLine xmlns="" xmlns:a14="http://schemas.microsoft.com/office/drawing/2010/main" w="9525">
                   <a:solidFill>
                     <a:srgbClr val="000000"/>
                   </a:solidFill>
@@ -2428,7 +2437,7 @@
             </a:ln>
             <a:extLst>
               <a:ext uri="{91240B29-F687-4f45-9708-019B960494DF}">
-                <a14:hiddenLine xmlns:a14="http://schemas.microsoft.com/office/drawing/2010/main" xmlns="" w="9525">
+                <a14:hiddenLine xmlns="" xmlns:a14="http://schemas.microsoft.com/office/drawing/2010/main" w="9525">
                   <a:solidFill>
                     <a:srgbClr val="000000"/>
                   </a:solidFill>
@@ -2490,7 +2499,7 @@
             </a:ln>
             <a:extLst>
               <a:ext uri="{91240B29-F687-4f45-9708-019B960494DF}">
-                <a14:hiddenLine xmlns:a14="http://schemas.microsoft.com/office/drawing/2010/main" xmlns="" w="9525">
+                <a14:hiddenLine xmlns="" xmlns:a14="http://schemas.microsoft.com/office/drawing/2010/main" w="9525">
                   <a:solidFill>
                     <a:srgbClr val="000000"/>
                   </a:solidFill>
@@ -2552,7 +2561,7 @@
             </a:ln>
             <a:extLst>
               <a:ext uri="{91240B29-F687-4f45-9708-019B960494DF}">
-                <a14:hiddenLine xmlns:a14="http://schemas.microsoft.com/office/drawing/2010/main" xmlns="" w="9525">
+                <a14:hiddenLine xmlns="" xmlns:a14="http://schemas.microsoft.com/office/drawing/2010/main" w="9525">
                   <a:solidFill>
                     <a:srgbClr val="000000"/>
                   </a:solidFill>
@@ -2642,7 +2651,7 @@
             </a:ln>
             <a:extLst>
               <a:ext uri="{91240B29-F687-4f45-9708-019B960494DF}">
-                <a14:hiddenLine xmlns:a14="http://schemas.microsoft.com/office/drawing/2010/main" xmlns="" w="9525">
+                <a14:hiddenLine xmlns="" xmlns:a14="http://schemas.microsoft.com/office/drawing/2010/main" w="9525">
                   <a:solidFill>
                     <a:srgbClr val="000000"/>
                   </a:solidFill>
@@ -2710,7 +2719,7 @@
             </a:ln>
             <a:extLst>
               <a:ext uri="{91240B29-F687-4f45-9708-019B960494DF}">
-                <a14:hiddenLine xmlns:a14="http://schemas.microsoft.com/office/drawing/2010/main" xmlns="" w="9525">
+                <a14:hiddenLine xmlns="" xmlns:a14="http://schemas.microsoft.com/office/drawing/2010/main" w="9525">
                   <a:solidFill>
                     <a:srgbClr val="000000"/>
                   </a:solidFill>
@@ -2772,7 +2781,7 @@
             </a:ln>
             <a:extLst>
               <a:ext uri="{91240B29-F687-4f45-9708-019B960494DF}">
-                <a14:hiddenLine xmlns:a14="http://schemas.microsoft.com/office/drawing/2010/main" xmlns="" w="9525">
+                <a14:hiddenLine xmlns="" xmlns:a14="http://schemas.microsoft.com/office/drawing/2010/main" w="9525">
                   <a:solidFill>
                     <a:srgbClr val="000000"/>
                   </a:solidFill>
@@ -2862,7 +2871,7 @@
             </a:ln>
             <a:extLst>
               <a:ext uri="{91240B29-F687-4f45-9708-019B960494DF}">
-                <a14:hiddenLine xmlns:a14="http://schemas.microsoft.com/office/drawing/2010/main" xmlns="" w="9525">
+                <a14:hiddenLine xmlns="" xmlns:a14="http://schemas.microsoft.com/office/drawing/2010/main" w="9525">
                   <a:solidFill>
                     <a:srgbClr val="000000"/>
                   </a:solidFill>
@@ -2924,7 +2933,7 @@
             </a:ln>
             <a:extLst>
               <a:ext uri="{91240B29-F687-4f45-9708-019B960494DF}">
-                <a14:hiddenLine xmlns:a14="http://schemas.microsoft.com/office/drawing/2010/main" xmlns="" w="9525">
+                <a14:hiddenLine xmlns="" xmlns:a14="http://schemas.microsoft.com/office/drawing/2010/main" w="9525">
                   <a:solidFill>
                     <a:srgbClr val="000000"/>
                   </a:solidFill>
@@ -3014,7 +3023,7 @@
             </a:ln>
             <a:extLst>
               <a:ext uri="{91240B29-F687-4f45-9708-019B960494DF}">
-                <a14:hiddenLine xmlns:a14="http://schemas.microsoft.com/office/drawing/2010/main" xmlns="" w="9525">
+                <a14:hiddenLine xmlns="" xmlns:a14="http://schemas.microsoft.com/office/drawing/2010/main" w="9525">
                   <a:solidFill>
                     <a:srgbClr val="000000"/>
                   </a:solidFill>
@@ -3076,7 +3085,7 @@
             </a:ln>
             <a:extLst>
               <a:ext uri="{91240B29-F687-4f45-9708-019B960494DF}">
-                <a14:hiddenLine xmlns:a14="http://schemas.microsoft.com/office/drawing/2010/main" xmlns="" w="9525">
+                <a14:hiddenLine xmlns="" xmlns:a14="http://schemas.microsoft.com/office/drawing/2010/main" w="9525">
                   <a:solidFill>
                     <a:srgbClr val="000000"/>
                   </a:solidFill>
@@ -3166,7 +3175,7 @@
             </a:ln>
             <a:extLst>
               <a:ext uri="{91240B29-F687-4f45-9708-019B960494DF}">
-                <a14:hiddenLine xmlns:a14="http://schemas.microsoft.com/office/drawing/2010/main" xmlns="" w="9525">
+                <a14:hiddenLine xmlns="" xmlns:a14="http://schemas.microsoft.com/office/drawing/2010/main" w="9525">
                   <a:solidFill>
                     <a:srgbClr val="000000"/>
                   </a:solidFill>
@@ -3200,7 +3209,7 @@
             </a:ln>
             <a:extLst>
               <a:ext uri="{91240B29-F687-4f45-9708-019B960494DF}">
-                <a14:hiddenLine xmlns:a14="http://schemas.microsoft.com/office/drawing/2010/main" xmlns="" w="9525">
+                <a14:hiddenLine xmlns="" xmlns:a14="http://schemas.microsoft.com/office/drawing/2010/main" w="9525">
                   <a:solidFill>
                     <a:srgbClr val="000000"/>
                   </a:solidFill>
@@ -3265,7 +3274,7 @@
             </a:ln>
             <a:extLst>
               <a:ext uri="{91240B29-F687-4f45-9708-019B960494DF}">
-                <a14:hiddenLine xmlns:a14="http://schemas.microsoft.com/office/drawing/2010/main" xmlns="" w="9525">
+                <a14:hiddenLine xmlns="" xmlns:a14="http://schemas.microsoft.com/office/drawing/2010/main" w="9525">
                   <a:solidFill>
                     <a:srgbClr val="000000"/>
                   </a:solidFill>
@@ -3355,7 +3364,7 @@
             </a:ln>
             <a:extLst>
               <a:ext uri="{91240B29-F687-4f45-9708-019B960494DF}">
-                <a14:hiddenLine xmlns:a14="http://schemas.microsoft.com/office/drawing/2010/main" xmlns="" w="9525">
+                <a14:hiddenLine xmlns="" xmlns:a14="http://schemas.microsoft.com/office/drawing/2010/main" w="9525">
                   <a:solidFill>
                     <a:srgbClr val="000000"/>
                   </a:solidFill>
@@ -3417,7 +3426,7 @@
             </a:ln>
             <a:extLst>
               <a:ext uri="{91240B29-F687-4f45-9708-019B960494DF}">
-                <a14:hiddenLine xmlns:a14="http://schemas.microsoft.com/office/drawing/2010/main" xmlns="" w="9525">
+                <a14:hiddenLine xmlns="" xmlns:a14="http://schemas.microsoft.com/office/drawing/2010/main" w="9525">
                   <a:solidFill>
                     <a:srgbClr val="000000"/>
                   </a:solidFill>
@@ -3507,7 +3516,7 @@
             </a:ln>
             <a:extLst>
               <a:ext uri="{91240B29-F687-4f45-9708-019B960494DF}">
-                <a14:hiddenLine xmlns:a14="http://schemas.microsoft.com/office/drawing/2010/main" xmlns="" w="9525">
+                <a14:hiddenLine xmlns="" xmlns:a14="http://schemas.microsoft.com/office/drawing/2010/main" w="9525">
                   <a:solidFill>
                     <a:srgbClr val="000000"/>
                   </a:solidFill>
@@ -3597,7 +3606,7 @@
             </a:ln>
             <a:extLst>
               <a:ext uri="{91240B29-F687-4f45-9708-019B960494DF}">
-                <a14:hiddenLine xmlns:a14="http://schemas.microsoft.com/office/drawing/2010/main" xmlns="" w="9525">
+                <a14:hiddenLine xmlns="" xmlns:a14="http://schemas.microsoft.com/office/drawing/2010/main" w="9525">
                   <a:solidFill>
                     <a:srgbClr val="000000"/>
                   </a:solidFill>
@@ -3662,7 +3671,7 @@
             </a:ln>
             <a:extLst>
               <a:ext uri="{91240B29-F687-4f45-9708-019B960494DF}">
-                <a14:hiddenLine xmlns:a14="http://schemas.microsoft.com/office/drawing/2010/main" xmlns="" w="9525">
+                <a14:hiddenLine xmlns="" xmlns:a14="http://schemas.microsoft.com/office/drawing/2010/main" w="9525">
                   <a:solidFill>
                     <a:srgbClr val="000000"/>
                   </a:solidFill>
@@ -3724,7 +3733,7 @@
             </a:ln>
             <a:extLst>
               <a:ext uri="{91240B29-F687-4f45-9708-019B960494DF}">
-                <a14:hiddenLine xmlns:a14="http://schemas.microsoft.com/office/drawing/2010/main" xmlns="" w="9525">
+                <a14:hiddenLine xmlns="" xmlns:a14="http://schemas.microsoft.com/office/drawing/2010/main" w="9525">
                   <a:solidFill>
                     <a:srgbClr val="000000"/>
                   </a:solidFill>
@@ -3814,7 +3823,7 @@
             </a:ln>
             <a:extLst>
               <a:ext uri="{91240B29-F687-4f45-9708-019B960494DF}">
-                <a14:hiddenLine xmlns:a14="http://schemas.microsoft.com/office/drawing/2010/main" xmlns="" w="9525">
+                <a14:hiddenLine xmlns="" xmlns:a14="http://schemas.microsoft.com/office/drawing/2010/main" w="9525">
                   <a:solidFill>
                     <a:srgbClr val="000000"/>
                   </a:solidFill>
@@ -3904,7 +3913,7 @@
             </a:ln>
             <a:extLst>
               <a:ext uri="{91240B29-F687-4f45-9708-019B960494DF}">
-                <a14:hiddenLine xmlns:a14="http://schemas.microsoft.com/office/drawing/2010/main" xmlns="" w="9525">
+                <a14:hiddenLine xmlns="" xmlns:a14="http://schemas.microsoft.com/office/drawing/2010/main" w="9525">
                   <a:solidFill>
                     <a:srgbClr val="000000"/>
                   </a:solidFill>
@@ -3966,7 +3975,7 @@
             </a:ln>
             <a:extLst>
               <a:ext uri="{91240B29-F687-4f45-9708-019B960494DF}">
-                <a14:hiddenLine xmlns:a14="http://schemas.microsoft.com/office/drawing/2010/main" xmlns="" w="9525">
+                <a14:hiddenLine xmlns="" xmlns:a14="http://schemas.microsoft.com/office/drawing/2010/main" w="9525">
                   <a:solidFill>
                     <a:srgbClr val="000000"/>
                   </a:solidFill>
@@ -4086,7 +4095,7 @@
             </a:ln>
             <a:extLst>
               <a:ext uri="{91240B29-F687-4f45-9708-019B960494DF}">
-                <a14:hiddenLine xmlns:a14="http://schemas.microsoft.com/office/drawing/2010/main" xmlns="" w="9525">
+                <a14:hiddenLine xmlns="" xmlns:a14="http://schemas.microsoft.com/office/drawing/2010/main" w="9525">
                   <a:solidFill>
                     <a:srgbClr val="000000"/>
                   </a:solidFill>
@@ -4154,7 +4163,7 @@
             </a:ln>
             <a:extLst>
               <a:ext uri="{91240B29-F687-4f45-9708-019B960494DF}">
-                <a14:hiddenLine xmlns:a14="http://schemas.microsoft.com/office/drawing/2010/main" xmlns="" w="9525">
+                <a14:hiddenLine xmlns="" xmlns:a14="http://schemas.microsoft.com/office/drawing/2010/main" w="9525">
                   <a:solidFill>
                     <a:srgbClr val="000000"/>
                   </a:solidFill>
@@ -4244,7 +4253,7 @@
             </a:ln>
             <a:extLst>
               <a:ext uri="{91240B29-F687-4f45-9708-019B960494DF}">
-                <a14:hiddenLine xmlns:a14="http://schemas.microsoft.com/office/drawing/2010/main" xmlns="" w="9525">
+                <a14:hiddenLine xmlns="" xmlns:a14="http://schemas.microsoft.com/office/drawing/2010/main" w="9525">
                   <a:solidFill>
                     <a:srgbClr val="000000"/>
                   </a:solidFill>
@@ -9051,7 +9060,7 @@
           <a:noFill/>
           <a:extLst>
             <a:ext uri="{909E8E84-426E-40dd-AFC4-6F175D3DCCD1}">
-              <a14:hiddenFill xmlns:a14="http://schemas.microsoft.com/office/drawing/2010/main" xmlns="">
+              <a14:hiddenFill xmlns="" xmlns:a14="http://schemas.microsoft.com/office/drawing/2010/main">
                 <a:solidFill>
                   <a:srgbClr val="FFFFFF"/>
                 </a:solidFill>
@@ -9125,7 +9134,7 @@
               </a:ln>
               <a:extLst>
                 <a:ext uri="{91240B29-F687-4f45-9708-019B960494DF}">
-                  <a14:hiddenLine xmlns:a14="http://schemas.microsoft.com/office/drawing/2010/main" xmlns="" w="9525">
+                  <a14:hiddenLine xmlns="" xmlns:a14="http://schemas.microsoft.com/office/drawing/2010/main" w="9525">
                     <a:solidFill>
                       <a:srgbClr val="000000"/>
                     </a:solidFill>
@@ -9215,7 +9224,7 @@
               </a:ln>
               <a:extLst>
                 <a:ext uri="{91240B29-F687-4f45-9708-019B960494DF}">
-                  <a14:hiddenLine xmlns:a14="http://schemas.microsoft.com/office/drawing/2010/main" xmlns="" w="9525">
+                  <a14:hiddenLine xmlns="" xmlns:a14="http://schemas.microsoft.com/office/drawing/2010/main" w="9525">
                     <a:solidFill>
                       <a:srgbClr val="000000"/>
                     </a:solidFill>
@@ -9305,7 +9314,7 @@
               </a:ln>
               <a:extLst>
                 <a:ext uri="{91240B29-F687-4f45-9708-019B960494DF}">
-                  <a14:hiddenLine xmlns:a14="http://schemas.microsoft.com/office/drawing/2010/main" xmlns="" w="9525">
+                  <a14:hiddenLine xmlns="" xmlns:a14="http://schemas.microsoft.com/office/drawing/2010/main" w="9525">
                     <a:solidFill>
                       <a:srgbClr val="000000"/>
                     </a:solidFill>
@@ -9367,7 +9376,7 @@
               </a:ln>
               <a:extLst>
                 <a:ext uri="{91240B29-F687-4f45-9708-019B960494DF}">
-                  <a14:hiddenLine xmlns:a14="http://schemas.microsoft.com/office/drawing/2010/main" xmlns="" w="9525">
+                  <a14:hiddenLine xmlns="" xmlns:a14="http://schemas.microsoft.com/office/drawing/2010/main" w="9525">
                     <a:solidFill>
                       <a:srgbClr val="000000"/>
                     </a:solidFill>
@@ -9457,7 +9466,7 @@
               </a:ln>
               <a:extLst>
                 <a:ext uri="{91240B29-F687-4f45-9708-019B960494DF}">
-                  <a14:hiddenLine xmlns:a14="http://schemas.microsoft.com/office/drawing/2010/main" xmlns="" w="9525">
+                  <a14:hiddenLine xmlns="" xmlns:a14="http://schemas.microsoft.com/office/drawing/2010/main" w="9525">
                     <a:solidFill>
                       <a:srgbClr val="000000"/>
                     </a:solidFill>
@@ -9519,7 +9528,7 @@
               </a:ln>
               <a:extLst>
                 <a:ext uri="{91240B29-F687-4f45-9708-019B960494DF}">
-                  <a14:hiddenLine xmlns:a14="http://schemas.microsoft.com/office/drawing/2010/main" xmlns="" w="9525">
+                  <a14:hiddenLine xmlns="" xmlns:a14="http://schemas.microsoft.com/office/drawing/2010/main" w="9525">
                     <a:solidFill>
                       <a:srgbClr val="000000"/>
                     </a:solidFill>
@@ -9581,7 +9590,7 @@
               </a:ln>
               <a:extLst>
                 <a:ext uri="{91240B29-F687-4f45-9708-019B960494DF}">
-                  <a14:hiddenLine xmlns:a14="http://schemas.microsoft.com/office/drawing/2010/main" xmlns="" w="9525">
+                  <a14:hiddenLine xmlns="" xmlns:a14="http://schemas.microsoft.com/office/drawing/2010/main" w="9525">
                     <a:solidFill>
                       <a:srgbClr val="000000"/>
                     </a:solidFill>
@@ -9671,7 +9680,7 @@
               </a:ln>
               <a:extLst>
                 <a:ext uri="{91240B29-F687-4f45-9708-019B960494DF}">
-                  <a14:hiddenLine xmlns:a14="http://schemas.microsoft.com/office/drawing/2010/main" xmlns="" w="9525">
+                  <a14:hiddenLine xmlns="" xmlns:a14="http://schemas.microsoft.com/office/drawing/2010/main" w="9525">
                     <a:solidFill>
                       <a:srgbClr val="000000"/>
                     </a:solidFill>
@@ -9761,7 +9770,7 @@
               </a:ln>
               <a:extLst>
                 <a:ext uri="{91240B29-F687-4f45-9708-019B960494DF}">
-                  <a14:hiddenLine xmlns:a14="http://schemas.microsoft.com/office/drawing/2010/main" xmlns="" w="9525">
+                  <a14:hiddenLine xmlns="" xmlns:a14="http://schemas.microsoft.com/office/drawing/2010/main" w="9525">
                     <a:solidFill>
                       <a:srgbClr val="000000"/>
                     </a:solidFill>
@@ -9823,7 +9832,7 @@
               </a:ln>
               <a:extLst>
                 <a:ext uri="{91240B29-F687-4f45-9708-019B960494DF}">
-                  <a14:hiddenLine xmlns:a14="http://schemas.microsoft.com/office/drawing/2010/main" xmlns="" w="9525">
+                  <a14:hiddenLine xmlns="" xmlns:a14="http://schemas.microsoft.com/office/drawing/2010/main" w="9525">
                     <a:solidFill>
                       <a:srgbClr val="000000"/>
                     </a:solidFill>
@@ -9933,7 +9942,7 @@
               </a:ln>
               <a:extLst>
                 <a:ext uri="{91240B29-F687-4f45-9708-019B960494DF}">
-                  <a14:hiddenLine xmlns:a14="http://schemas.microsoft.com/office/drawing/2010/main" xmlns="" w="9525">
+                  <a14:hiddenLine xmlns="" xmlns:a14="http://schemas.microsoft.com/office/drawing/2010/main" w="9525">
                     <a:solidFill>
                       <a:srgbClr val="000000"/>
                     </a:solidFill>
@@ -10017,7 +10026,7 @@
               </a:ln>
               <a:extLst>
                 <a:ext uri="{91240B29-F687-4f45-9708-019B960494DF}">
-                  <a14:hiddenLine xmlns:a14="http://schemas.microsoft.com/office/drawing/2010/main" xmlns="" w="9525">
+                  <a14:hiddenLine xmlns="" xmlns:a14="http://schemas.microsoft.com/office/drawing/2010/main" w="9525">
                     <a:solidFill>
                       <a:srgbClr val="000000"/>
                     </a:solidFill>
@@ -10079,7 +10088,7 @@
               </a:ln>
               <a:extLst>
                 <a:ext uri="{91240B29-F687-4f45-9708-019B960494DF}">
-                  <a14:hiddenLine xmlns:a14="http://schemas.microsoft.com/office/drawing/2010/main" xmlns="" w="9525">
+                  <a14:hiddenLine xmlns="" xmlns:a14="http://schemas.microsoft.com/office/drawing/2010/main" w="9525">
                     <a:solidFill>
                       <a:srgbClr val="000000"/>
                     </a:solidFill>
@@ -10141,7 +10150,7 @@
               </a:ln>
               <a:extLst>
                 <a:ext uri="{91240B29-F687-4f45-9708-019B960494DF}">
-                  <a14:hiddenLine xmlns:a14="http://schemas.microsoft.com/office/drawing/2010/main" xmlns="" w="9525">
+                  <a14:hiddenLine xmlns="" xmlns:a14="http://schemas.microsoft.com/office/drawing/2010/main" w="9525">
                     <a:solidFill>
                       <a:srgbClr val="000000"/>
                     </a:solidFill>
@@ -10231,7 +10240,7 @@
               </a:ln>
               <a:extLst>
                 <a:ext uri="{91240B29-F687-4f45-9708-019B960494DF}">
-                  <a14:hiddenLine xmlns:a14="http://schemas.microsoft.com/office/drawing/2010/main" xmlns="" w="9525">
+                  <a14:hiddenLine xmlns="" xmlns:a14="http://schemas.microsoft.com/office/drawing/2010/main" w="9525">
                     <a:solidFill>
                       <a:srgbClr val="000000"/>
                     </a:solidFill>
@@ -10265,7 +10274,7 @@
               </a:ln>
               <a:extLst>
                 <a:ext uri="{91240B29-F687-4f45-9708-019B960494DF}">
-                  <a14:hiddenLine xmlns:a14="http://schemas.microsoft.com/office/drawing/2010/main" xmlns="" w="9525">
+                  <a14:hiddenLine xmlns="" xmlns:a14="http://schemas.microsoft.com/office/drawing/2010/main" w="9525">
                     <a:solidFill>
                       <a:srgbClr val="000000"/>
                     </a:solidFill>
@@ -10330,7 +10339,7 @@
               </a:ln>
               <a:extLst>
                 <a:ext uri="{91240B29-F687-4f45-9708-019B960494DF}">
-                  <a14:hiddenLine xmlns:a14="http://schemas.microsoft.com/office/drawing/2010/main" xmlns="" w="9525">
+                  <a14:hiddenLine xmlns="" xmlns:a14="http://schemas.microsoft.com/office/drawing/2010/main" w="9525">
                     <a:solidFill>
                       <a:srgbClr val="000000"/>
                     </a:solidFill>
@@ -10420,7 +10429,7 @@
               </a:ln>
               <a:extLst>
                 <a:ext uri="{91240B29-F687-4f45-9708-019B960494DF}">
-                  <a14:hiddenLine xmlns:a14="http://schemas.microsoft.com/office/drawing/2010/main" xmlns="" w="9525">
+                  <a14:hiddenLine xmlns="" xmlns:a14="http://schemas.microsoft.com/office/drawing/2010/main" w="9525">
                     <a:solidFill>
                       <a:srgbClr val="000000"/>
                     </a:solidFill>
@@ -10482,7 +10491,7 @@
               </a:ln>
               <a:extLst>
                 <a:ext uri="{91240B29-F687-4f45-9708-019B960494DF}">
-                  <a14:hiddenLine xmlns:a14="http://schemas.microsoft.com/office/drawing/2010/main" xmlns="" w="9525">
+                  <a14:hiddenLine xmlns="" xmlns:a14="http://schemas.microsoft.com/office/drawing/2010/main" w="9525">
                     <a:solidFill>
                       <a:srgbClr val="000000"/>
                     </a:solidFill>
@@ -10572,7 +10581,7 @@
               </a:ln>
               <a:extLst>
                 <a:ext uri="{91240B29-F687-4f45-9708-019B960494DF}">
-                  <a14:hiddenLine xmlns:a14="http://schemas.microsoft.com/office/drawing/2010/main" xmlns="" w="9525">
+                  <a14:hiddenLine xmlns="" xmlns:a14="http://schemas.microsoft.com/office/drawing/2010/main" w="9525">
                     <a:solidFill>
                       <a:srgbClr val="000000"/>
                     </a:solidFill>
@@ -10637,7 +10646,7 @@
               </a:ln>
               <a:extLst>
                 <a:ext uri="{91240B29-F687-4f45-9708-019B960494DF}">
-                  <a14:hiddenLine xmlns:a14="http://schemas.microsoft.com/office/drawing/2010/main" xmlns="" w="9525">
+                  <a14:hiddenLine xmlns="" xmlns:a14="http://schemas.microsoft.com/office/drawing/2010/main" w="9525">
                     <a:solidFill>
                       <a:srgbClr val="000000"/>
                     </a:solidFill>
@@ -10699,7 +10708,7 @@
               </a:ln>
               <a:extLst>
                 <a:ext uri="{91240B29-F687-4f45-9708-019B960494DF}">
-                  <a14:hiddenLine xmlns:a14="http://schemas.microsoft.com/office/drawing/2010/main" xmlns="" w="9525">
+                  <a14:hiddenLine xmlns="" xmlns:a14="http://schemas.microsoft.com/office/drawing/2010/main" w="9525">
                     <a:solidFill>
                       <a:srgbClr val="000000"/>
                     </a:solidFill>
@@ -10789,7 +10798,7 @@
               </a:ln>
               <a:extLst>
                 <a:ext uri="{91240B29-F687-4f45-9708-019B960494DF}">
-                  <a14:hiddenLine xmlns:a14="http://schemas.microsoft.com/office/drawing/2010/main" xmlns="" w="9525">
+                  <a14:hiddenLine xmlns="" xmlns:a14="http://schemas.microsoft.com/office/drawing/2010/main" w="9525">
                     <a:solidFill>
                       <a:srgbClr val="000000"/>
                     </a:solidFill>
@@ -10879,7 +10888,7 @@
               </a:ln>
               <a:extLst>
                 <a:ext uri="{91240B29-F687-4f45-9708-019B960494DF}">
-                  <a14:hiddenLine xmlns:a14="http://schemas.microsoft.com/office/drawing/2010/main" xmlns="" w="9525">
+                  <a14:hiddenLine xmlns="" xmlns:a14="http://schemas.microsoft.com/office/drawing/2010/main" w="9525">
                     <a:solidFill>
                       <a:srgbClr val="000000"/>
                     </a:solidFill>
@@ -10944,7 +10953,7 @@
               </a:ln>
               <a:extLst>
                 <a:ext uri="{91240B29-F687-4f45-9708-019B960494DF}">
-                  <a14:hiddenLine xmlns:a14="http://schemas.microsoft.com/office/drawing/2010/main" xmlns="" w="9525">
+                  <a14:hiddenLine xmlns="" xmlns:a14="http://schemas.microsoft.com/office/drawing/2010/main" w="9525">
                     <a:solidFill>
                       <a:srgbClr val="000000"/>
                     </a:solidFill>
@@ -11064,7 +11073,7 @@
               </a:ln>
               <a:extLst>
                 <a:ext uri="{91240B29-F687-4f45-9708-019B960494DF}">
-                  <a14:hiddenLine xmlns:a14="http://schemas.microsoft.com/office/drawing/2010/main" xmlns="" w="9525">
+                  <a14:hiddenLine xmlns="" xmlns:a14="http://schemas.microsoft.com/office/drawing/2010/main" w="9525">
                     <a:solidFill>
                       <a:srgbClr val="000000"/>
                     </a:solidFill>
@@ -11162,7 +11171,7 @@
               </a:ln>
               <a:extLst>
                 <a:ext uri="{91240B29-F687-4f45-9708-019B960494DF}">
-                  <a14:hiddenLine xmlns:a14="http://schemas.microsoft.com/office/drawing/2010/main" xmlns="" w="9525">
+                  <a14:hiddenLine xmlns="" xmlns:a14="http://schemas.microsoft.com/office/drawing/2010/main" w="9525">
                     <a:solidFill>
                       <a:srgbClr val="000000"/>
                     </a:solidFill>
@@ -11277,7 +11286,7 @@
               </a:ln>
               <a:extLst>
                 <a:ext uri="{91240B29-F687-4f45-9708-019B960494DF}">
-                  <a14:hiddenLine xmlns:a14="http://schemas.microsoft.com/office/drawing/2010/main" xmlns="" w="9525">
+                  <a14:hiddenLine xmlns="" xmlns:a14="http://schemas.microsoft.com/office/drawing/2010/main" w="9525">
                     <a:solidFill>
                       <a:srgbClr val="000000"/>
                     </a:solidFill>
@@ -11367,7 +11376,7 @@
               </a:ln>
               <a:extLst>
                 <a:ext uri="{91240B29-F687-4f45-9708-019B960494DF}">
-                  <a14:hiddenLine xmlns:a14="http://schemas.microsoft.com/office/drawing/2010/main" xmlns="" w="9525">
+                  <a14:hiddenLine xmlns="" xmlns:a14="http://schemas.microsoft.com/office/drawing/2010/main" w="9525">
                     <a:solidFill>
                       <a:srgbClr val="000000"/>
                     </a:solidFill>
@@ -11432,7 +11441,7 @@
               </a:ln>
               <a:extLst>
                 <a:ext uri="{91240B29-F687-4f45-9708-019B960494DF}">
-                  <a14:hiddenLine xmlns:a14="http://schemas.microsoft.com/office/drawing/2010/main" xmlns="" w="9525">
+                  <a14:hiddenLine xmlns="" xmlns:a14="http://schemas.microsoft.com/office/drawing/2010/main" w="9525">
                     <a:solidFill>
                       <a:srgbClr val="000000"/>
                     </a:solidFill>
@@ -11522,7 +11531,7 @@
               </a:ln>
               <a:extLst>
                 <a:ext uri="{91240B29-F687-4f45-9708-019B960494DF}">
-                  <a14:hiddenLine xmlns:a14="http://schemas.microsoft.com/office/drawing/2010/main" xmlns="" w="9525">
+                  <a14:hiddenLine xmlns="" xmlns:a14="http://schemas.microsoft.com/office/drawing/2010/main" w="9525">
                     <a:solidFill>
                       <a:srgbClr val="000000"/>
                     </a:solidFill>
@@ -11590,7 +11599,7 @@
               </a:ln>
               <a:extLst>
                 <a:ext uri="{91240B29-F687-4f45-9708-019B960494DF}">
-                  <a14:hiddenLine xmlns:a14="http://schemas.microsoft.com/office/drawing/2010/main" xmlns="" w="9525">
+                  <a14:hiddenLine xmlns="" xmlns:a14="http://schemas.microsoft.com/office/drawing/2010/main" w="9525">
                     <a:solidFill>
                       <a:srgbClr val="000000"/>
                     </a:solidFill>
@@ -11680,7 +11689,7 @@
               </a:ln>
               <a:extLst>
                 <a:ext uri="{91240B29-F687-4f45-9708-019B960494DF}">
-                  <a14:hiddenLine xmlns:a14="http://schemas.microsoft.com/office/drawing/2010/main" xmlns="" w="9525">
+                  <a14:hiddenLine xmlns="" xmlns:a14="http://schemas.microsoft.com/office/drawing/2010/main" w="9525">
                     <a:solidFill>
                       <a:srgbClr val="000000"/>
                     </a:solidFill>
@@ -11748,7 +11757,7 @@
               </a:ln>
               <a:extLst>
                 <a:ext uri="{91240B29-F687-4f45-9708-019B960494DF}">
-                  <a14:hiddenLine xmlns:a14="http://schemas.microsoft.com/office/drawing/2010/main" xmlns="" w="9525">
+                  <a14:hiddenLine xmlns="" xmlns:a14="http://schemas.microsoft.com/office/drawing/2010/main" w="9525">
                     <a:solidFill>
                       <a:srgbClr val="000000"/>
                     </a:solidFill>
@@ -11838,7 +11847,7 @@
               </a:ln>
               <a:extLst>
                 <a:ext uri="{91240B29-F687-4f45-9708-019B960494DF}">
-                  <a14:hiddenLine xmlns:a14="http://schemas.microsoft.com/office/drawing/2010/main" xmlns="" w="9525">
+                  <a14:hiddenLine xmlns="" xmlns:a14="http://schemas.microsoft.com/office/drawing/2010/main" w="9525">
                     <a:solidFill>
                       <a:srgbClr val="000000"/>
                     </a:solidFill>
@@ -11872,7 +11881,7 @@
               </a:ln>
               <a:extLst>
                 <a:ext uri="{91240B29-F687-4f45-9708-019B960494DF}">
-                  <a14:hiddenLine xmlns:a14="http://schemas.microsoft.com/office/drawing/2010/main" xmlns="" w="9525">
+                  <a14:hiddenLine xmlns="" xmlns:a14="http://schemas.microsoft.com/office/drawing/2010/main" w="9525">
                     <a:solidFill>
                       <a:srgbClr val="000000"/>
                     </a:solidFill>
@@ -12450,7 +12459,7 @@
         </p:nvSpPr>
         <p:spPr>
           <a:xfrm>
-            <a:off x="3257550" y="1600200"/>
+            <a:off x="3400425" y="1854200"/>
             <a:ext cx="8791575" cy="2387600"/>
           </a:xfrm>
         </p:spPr>
@@ -12462,21 +12471,21 @@
           <a:p>
             <a:pPr algn="r"/>
             <a:r>
-              <a:rPr lang="en-IN" sz="7200" b="1" dirty="0"/>
+              <a:rPr lang="en-IN" sz="8000" b="1" dirty="0"/>
               <a:t>ATTENDANCE </a:t>
             </a:r>
             <a:br>
-              <a:rPr lang="en-IN" sz="7200" b="1" dirty="0"/>
+              <a:rPr lang="en-IN" sz="8000" b="1" dirty="0"/>
             </a:br>
             <a:r>
-              <a:rPr lang="en-IN" sz="7200" b="1" dirty="0"/>
+              <a:rPr lang="en-IN" sz="8000" b="1" dirty="0"/>
               <a:t>USING </a:t>
             </a:r>
             <a:br>
-              <a:rPr lang="en-IN" sz="7200" b="1" dirty="0"/>
+              <a:rPr lang="en-IN" sz="8000" b="1" dirty="0"/>
             </a:br>
             <a:r>
-              <a:rPr lang="en-IN" sz="7200" b="1" dirty="0"/>
+              <a:rPr lang="en-IN" sz="8000" b="1" dirty="0"/>
               <a:t>FACIAL RECOGNITION</a:t>
             </a:r>
           </a:p>
@@ -12500,7 +12509,7 @@
         </p:nvSpPr>
         <p:spPr>
           <a:xfrm>
-            <a:off x="8439150" y="5943600"/>
+            <a:off x="7635700" y="4902605"/>
             <a:ext cx="3752850" cy="914400"/>
           </a:xfrm>
         </p:spPr>
@@ -12521,7 +12530,7 @@
           </a:p>
           <a:p>
             <a:r>
-              <a:rPr lang="en-IN" dirty="0">
+              <a:rPr lang="en-IN" b="1" i="1" u="sng" dirty="0">
                 <a:solidFill>
                   <a:schemeClr val="tx1"/>
                 </a:solidFill>
@@ -12529,14 +12538,14 @@
               <a:t>Rohit raj &amp; Abhishek </a:t>
             </a:r>
             <a:r>
-              <a:rPr lang="en-IN" dirty="0" err="1">
+              <a:rPr lang="en-IN" b="1" i="1" u="sng" dirty="0" err="1">
                 <a:solidFill>
                   <a:schemeClr val="tx1"/>
                 </a:solidFill>
               </a:rPr>
               <a:t>kumar</a:t>
             </a:r>
-            <a:endParaRPr lang="en-IN" dirty="0">
+            <a:endParaRPr lang="en-IN" b="1" i="1" u="sng" dirty="0">
               <a:solidFill>
                 <a:schemeClr val="tx1"/>
               </a:solidFill>
@@ -12566,7 +12575,7 @@
         </p:blipFill>
         <p:spPr>
           <a:xfrm>
-            <a:off x="2859341" y="-219075"/>
+            <a:off x="1567868" y="-219075"/>
             <a:ext cx="3791883" cy="4029075"/>
           </a:xfrm>
           <a:prstGeom prst="rect">
@@ -12595,7 +12604,7 @@
         </p:blipFill>
         <p:spPr>
           <a:xfrm>
-            <a:off x="2113936" y="3810000"/>
+            <a:off x="2062070" y="3810000"/>
             <a:ext cx="4770181" cy="3099611"/>
           </a:xfrm>
           <a:prstGeom prst="rect">
@@ -12620,6 +12629,183 @@
 </file>
 
 <file path=ppt/slides/slide2.xml><?xml version="1.0" encoding="utf-8"?>
+<p:sld xmlns:a="http://schemas.openxmlformats.org/drawingml/2006/main" xmlns:r="http://schemas.openxmlformats.org/officeDocument/2006/relationships" xmlns:p="http://schemas.openxmlformats.org/presentationml/2006/main">
+  <p:cSld>
+    <p:spTree>
+      <p:nvGrpSpPr>
+        <p:cNvPr id="1" name=""/>
+        <p:cNvGrpSpPr/>
+        <p:nvPr/>
+      </p:nvGrpSpPr>
+      <p:grpSpPr>
+        <a:xfrm>
+          <a:off x="0" y="0"/>
+          <a:ext cx="0" cy="0"/>
+          <a:chOff x="0" y="0"/>
+          <a:chExt cx="0" cy="0"/>
+        </a:xfrm>
+      </p:grpSpPr>
+      <p:sp>
+        <p:nvSpPr>
+          <p:cNvPr id="2" name="Title 1">
+            <a:extLst>
+              <a:ext uri="{FF2B5EF4-FFF2-40B4-BE49-F238E27FC236}">
+                <a16:creationId xmlns:a16="http://schemas.microsoft.com/office/drawing/2014/main" id="{34AD5B48-59DF-4140-A638-99B1E35D17E5}"/>
+              </a:ext>
+            </a:extLst>
+          </p:cNvPr>
+          <p:cNvSpPr>
+            <a:spLocks noGrp="1"/>
+          </p:cNvSpPr>
+          <p:nvPr>
+            <p:ph type="title"/>
+          </p:nvPr>
+        </p:nvSpPr>
+        <p:spPr>
+          <a:xfrm>
+            <a:off x="772998" y="618518"/>
+            <a:ext cx="10274413" cy="4915016"/>
+          </a:xfrm>
+        </p:spPr>
+        <p:txBody>
+          <a:bodyPr>
+            <a:normAutofit/>
+          </a:bodyPr>
+          <a:lstStyle/>
+          <a:p>
+            <a:r>
+              <a:rPr lang="en-IN" sz="7200" dirty="0"/>
+              <a:t>WHAT IS FACE </a:t>
+            </a:r>
+            <a:br>
+              <a:rPr lang="en-IN" sz="7200" dirty="0"/>
+            </a:br>
+            <a:r>
+              <a:rPr lang="en-IN" sz="7200" dirty="0"/>
+              <a:t>RECOGNITION ?</a:t>
+            </a:r>
+          </a:p>
+        </p:txBody>
+      </p:sp>
+      <p:pic>
+        <p:nvPicPr>
+          <p:cNvPr id="5" name="Picture 4">
+            <a:extLst>
+              <a:ext uri="{FF2B5EF4-FFF2-40B4-BE49-F238E27FC236}">
+                <a16:creationId xmlns:a16="http://schemas.microsoft.com/office/drawing/2014/main" id="{C57AF116-3A3E-49AF-BD05-BB159744A8C3}"/>
+              </a:ext>
+            </a:extLst>
+          </p:cNvPr>
+          <p:cNvPicPr>
+            <a:picLocks noChangeAspect="1"/>
+          </p:cNvPicPr>
+          <p:nvPr/>
+        </p:nvPicPr>
+        <p:blipFill>
+          <a:blip r:embed="rId2"/>
+          <a:stretch>
+            <a:fillRect/>
+          </a:stretch>
+        </p:blipFill>
+        <p:spPr>
+          <a:xfrm>
+            <a:off x="6711884" y="1772238"/>
+            <a:ext cx="5480115" cy="3082565"/>
+          </a:xfrm>
+          <a:prstGeom prst="rect">
+            <a:avLst/>
+          </a:prstGeom>
+        </p:spPr>
+      </p:pic>
+    </p:spTree>
+    <p:extLst>
+      <p:ext uri="{BB962C8B-B14F-4D97-AF65-F5344CB8AC3E}">
+        <p14:creationId xmlns:p14="http://schemas.microsoft.com/office/powerpoint/2010/main" val="4006117431"/>
+      </p:ext>
+    </p:extLst>
+  </p:cSld>
+  <p:clrMapOvr>
+    <a:masterClrMapping/>
+  </p:clrMapOvr>
+</p:sld>
+</file>
+
+<file path=ppt/slides/slide3.xml><?xml version="1.0" encoding="utf-8"?>
+<p:sld xmlns:a="http://schemas.openxmlformats.org/drawingml/2006/main" xmlns:r="http://schemas.openxmlformats.org/officeDocument/2006/relationships" xmlns:p="http://schemas.openxmlformats.org/presentationml/2006/main">
+  <p:cSld>
+    <p:spTree>
+      <p:nvGrpSpPr>
+        <p:cNvPr id="1" name=""/>
+        <p:cNvGrpSpPr/>
+        <p:nvPr/>
+      </p:nvGrpSpPr>
+      <p:grpSpPr>
+        <a:xfrm>
+          <a:off x="0" y="0"/>
+          <a:ext cx="0" cy="0"/>
+          <a:chOff x="0" y="0"/>
+          <a:chExt cx="0" cy="0"/>
+        </a:xfrm>
+      </p:grpSpPr>
+      <p:sp>
+        <p:nvSpPr>
+          <p:cNvPr id="3" name="Content Placeholder 2">
+            <a:extLst>
+              <a:ext uri="{FF2B5EF4-FFF2-40B4-BE49-F238E27FC236}">
+                <a16:creationId xmlns:a16="http://schemas.microsoft.com/office/drawing/2014/main" id="{17AD8EAE-05E2-4E91-B01F-62C3B3017067}"/>
+              </a:ext>
+            </a:extLst>
+          </p:cNvPr>
+          <p:cNvSpPr>
+            <a:spLocks noGrp="1"/>
+          </p:cNvSpPr>
+          <p:nvPr>
+            <p:ph idx="1"/>
+          </p:nvPr>
+        </p:nvSpPr>
+        <p:spPr>
+          <a:xfrm>
+            <a:off x="1075425" y="1658143"/>
+            <a:ext cx="9905999" cy="3541714"/>
+          </a:xfrm>
+        </p:spPr>
+        <p:txBody>
+          <a:bodyPr/>
+          <a:lstStyle/>
+          <a:p>
+            <a:r>
+              <a:rPr lang="en-IN" dirty="0"/>
+              <a:t>Face Recognition is a branch of AI that can uniquely identify a person by analyzing known patterns</a:t>
+            </a:r>
+          </a:p>
+          <a:p>
+            <a:r>
+              <a:rPr lang="en-IN" dirty="0"/>
+              <a:t>It can analyze a picture and recognize the faces in it </a:t>
+            </a:r>
+          </a:p>
+          <a:p>
+            <a:r>
+              <a:rPr lang="en-IN" dirty="0"/>
+              <a:t>Face Recognition technology can be as good or even better than humans in determining whether two photographed images are of the same person.</a:t>
+            </a:r>
+          </a:p>
+        </p:txBody>
+      </p:sp>
+    </p:spTree>
+    <p:extLst>
+      <p:ext uri="{BB962C8B-B14F-4D97-AF65-F5344CB8AC3E}">
+        <p14:creationId xmlns:p14="http://schemas.microsoft.com/office/powerpoint/2010/main" val="4091437478"/>
+      </p:ext>
+    </p:extLst>
+  </p:cSld>
+  <p:clrMapOvr>
+    <a:masterClrMapping/>
+  </p:clrMapOvr>
+</p:sld>
+</file>
+
+<file path=ppt/slides/slide4.xml><?xml version="1.0" encoding="utf-8"?>
 <p:sld xmlns:a="http://schemas.openxmlformats.org/drawingml/2006/main" xmlns:r="http://schemas.openxmlformats.org/officeDocument/2006/relationships" xmlns:p="http://schemas.openxmlformats.org/presentationml/2006/main">
   <p:cSld>
     <p:spTree>
@@ -12671,6 +12857,402 @@
     <p:extLst>
       <p:ext uri="{BB962C8B-B14F-4D97-AF65-F5344CB8AC3E}">
         <p14:creationId xmlns:p14="http://schemas.microsoft.com/office/powerpoint/2010/main" val="860642568"/>
+      </p:ext>
+    </p:extLst>
+  </p:cSld>
+  <p:clrMapOvr>
+    <a:masterClrMapping/>
+  </p:clrMapOvr>
+</p:sld>
+</file>
+
+<file path=ppt/slides/slide5.xml><?xml version="1.0" encoding="utf-8"?>
+<p:sld xmlns:a="http://schemas.openxmlformats.org/drawingml/2006/main" xmlns:r="http://schemas.openxmlformats.org/officeDocument/2006/relationships" xmlns:p="http://schemas.openxmlformats.org/presentationml/2006/main">
+  <p:cSld>
+    <p:spTree>
+      <p:nvGrpSpPr>
+        <p:cNvPr id="1" name=""/>
+        <p:cNvGrpSpPr/>
+        <p:nvPr/>
+      </p:nvGrpSpPr>
+      <p:grpSpPr>
+        <a:xfrm>
+          <a:off x="0" y="0"/>
+          <a:ext cx="0" cy="0"/>
+          <a:chOff x="0" y="0"/>
+          <a:chExt cx="0" cy="0"/>
+        </a:xfrm>
+      </p:grpSpPr>
+      <p:sp>
+        <p:nvSpPr>
+          <p:cNvPr id="3" name="Content Placeholder 2">
+            <a:extLst>
+              <a:ext uri="{FF2B5EF4-FFF2-40B4-BE49-F238E27FC236}">
+                <a16:creationId xmlns:a16="http://schemas.microsoft.com/office/drawing/2014/main" id="{D9EE3455-2862-485A-9B0F-BCD19C83AC3D}"/>
+              </a:ext>
+            </a:extLst>
+          </p:cNvPr>
+          <p:cNvSpPr>
+            <a:spLocks noGrp="1"/>
+          </p:cNvSpPr>
+          <p:nvPr>
+            <p:ph idx="1"/>
+          </p:nvPr>
+        </p:nvSpPr>
+        <p:spPr>
+          <a:xfrm>
+            <a:off x="1263960" y="741198"/>
+            <a:ext cx="9905999" cy="5640748"/>
+          </a:xfrm>
+        </p:spPr>
+        <p:txBody>
+          <a:bodyPr>
+            <a:normAutofit/>
+          </a:bodyPr>
+          <a:lstStyle/>
+          <a:p>
+            <a:r>
+              <a:rPr lang="en-US" dirty="0"/>
+              <a:t>First, your face is captured with a photo or video</a:t>
+            </a:r>
+          </a:p>
+          <a:p>
+            <a:r>
+              <a:rPr lang="en-US" dirty="0"/>
+              <a:t>The software then measures a variety of facial features called landmarks or nodal points on the face</a:t>
+            </a:r>
+          </a:p>
+          <a:p>
+            <a:r>
+              <a:rPr lang="en-US" dirty="0"/>
+              <a:t>These could include the distance between the eyes, the width of the nose, depth of eye sockets, distance from forehead to chin.</a:t>
+            </a:r>
+          </a:p>
+          <a:p>
+            <a:r>
+              <a:rPr lang="en-US" dirty="0"/>
+              <a:t>This information is then converted into a mathematical formula which represents your unique facial signature</a:t>
+            </a:r>
+          </a:p>
+          <a:p>
+            <a:r>
+              <a:rPr lang="en-US" dirty="0"/>
+              <a:t>That facial signature is then compared to a database of known faces</a:t>
+            </a:r>
+            <a:endParaRPr lang="en-IN" dirty="0"/>
+          </a:p>
+        </p:txBody>
+      </p:sp>
+    </p:spTree>
+    <p:extLst>
+      <p:ext uri="{BB962C8B-B14F-4D97-AF65-F5344CB8AC3E}">
+        <p14:creationId xmlns:p14="http://schemas.microsoft.com/office/powerpoint/2010/main" val="2416012596"/>
+      </p:ext>
+    </p:extLst>
+  </p:cSld>
+  <p:clrMapOvr>
+    <a:masterClrMapping/>
+  </p:clrMapOvr>
+  <p:timing>
+    <p:tnLst>
+      <p:par>
+        <p:cTn id="1" dur="indefinite" restart="never" nodeType="tmRoot">
+          <p:childTnLst>
+            <p:seq concurrent="1" nextAc="seek">
+              <p:cTn id="2" dur="indefinite" nodeType="mainSeq">
+                <p:childTnLst>
+                  <p:par>
+                    <p:cTn id="3" fill="hold">
+                      <p:stCondLst>
+                        <p:cond delay="indefinite"/>
+                      </p:stCondLst>
+                      <p:childTnLst>
+                        <p:par>
+                          <p:cTn id="4" fill="hold">
+                            <p:stCondLst>
+                              <p:cond delay="0"/>
+                            </p:stCondLst>
+                            <p:childTnLst>
+                              <p:par>
+                                <p:cTn id="5" presetID="1" presetClass="entr" presetSubtype="0" fill="hold" nodeType="clickEffect">
+                                  <p:stCondLst>
+                                    <p:cond delay="0"/>
+                                  </p:stCondLst>
+                                  <p:childTnLst>
+                                    <p:set>
+                                      <p:cBhvr>
+                                        <p:cTn id="6" dur="1" fill="hold">
+                                          <p:stCondLst>
+                                            <p:cond delay="0"/>
+                                          </p:stCondLst>
+                                        </p:cTn>
+                                        <p:tgtEl>
+                                          <p:spTgt spid="3">
+                                            <p:txEl>
+                                              <p:pRg st="1" end="1"/>
+                                            </p:txEl>
+                                          </p:spTgt>
+                                        </p:tgtEl>
+                                        <p:attrNameLst>
+                                          <p:attrName>style.visibility</p:attrName>
+                                        </p:attrNameLst>
+                                      </p:cBhvr>
+                                      <p:to>
+                                        <p:strVal val="visible"/>
+                                      </p:to>
+                                    </p:set>
+                                  </p:childTnLst>
+                                </p:cTn>
+                              </p:par>
+                            </p:childTnLst>
+                          </p:cTn>
+                        </p:par>
+                      </p:childTnLst>
+                    </p:cTn>
+                  </p:par>
+                  <p:par>
+                    <p:cTn id="7" fill="hold">
+                      <p:stCondLst>
+                        <p:cond delay="indefinite"/>
+                      </p:stCondLst>
+                      <p:childTnLst>
+                        <p:par>
+                          <p:cTn id="8" fill="hold">
+                            <p:stCondLst>
+                              <p:cond delay="0"/>
+                            </p:stCondLst>
+                            <p:childTnLst>
+                              <p:par>
+                                <p:cTn id="9" presetID="1" presetClass="entr" presetSubtype="0" fill="hold" nodeType="clickEffect">
+                                  <p:stCondLst>
+                                    <p:cond delay="0"/>
+                                  </p:stCondLst>
+                                  <p:childTnLst>
+                                    <p:set>
+                                      <p:cBhvr>
+                                        <p:cTn id="10" dur="1" fill="hold">
+                                          <p:stCondLst>
+                                            <p:cond delay="0"/>
+                                          </p:stCondLst>
+                                        </p:cTn>
+                                        <p:tgtEl>
+                                          <p:spTgt spid="3">
+                                            <p:txEl>
+                                              <p:pRg st="2" end="2"/>
+                                            </p:txEl>
+                                          </p:spTgt>
+                                        </p:tgtEl>
+                                        <p:attrNameLst>
+                                          <p:attrName>style.visibility</p:attrName>
+                                        </p:attrNameLst>
+                                      </p:cBhvr>
+                                      <p:to>
+                                        <p:strVal val="visible"/>
+                                      </p:to>
+                                    </p:set>
+                                  </p:childTnLst>
+                                </p:cTn>
+                              </p:par>
+                            </p:childTnLst>
+                          </p:cTn>
+                        </p:par>
+                      </p:childTnLst>
+                    </p:cTn>
+                  </p:par>
+                  <p:par>
+                    <p:cTn id="11" fill="hold">
+                      <p:stCondLst>
+                        <p:cond delay="indefinite"/>
+                      </p:stCondLst>
+                      <p:childTnLst>
+                        <p:par>
+                          <p:cTn id="12" fill="hold">
+                            <p:stCondLst>
+                              <p:cond delay="0"/>
+                            </p:stCondLst>
+                            <p:childTnLst>
+                              <p:par>
+                                <p:cTn id="13" presetID="1" presetClass="entr" presetSubtype="0" fill="hold" nodeType="clickEffect">
+                                  <p:stCondLst>
+                                    <p:cond delay="0"/>
+                                  </p:stCondLst>
+                                  <p:childTnLst>
+                                    <p:set>
+                                      <p:cBhvr>
+                                        <p:cTn id="14" dur="1" fill="hold">
+                                          <p:stCondLst>
+                                            <p:cond delay="0"/>
+                                          </p:stCondLst>
+                                        </p:cTn>
+                                        <p:tgtEl>
+                                          <p:spTgt spid="3">
+                                            <p:txEl>
+                                              <p:pRg st="3" end="3"/>
+                                            </p:txEl>
+                                          </p:spTgt>
+                                        </p:tgtEl>
+                                        <p:attrNameLst>
+                                          <p:attrName>style.visibility</p:attrName>
+                                        </p:attrNameLst>
+                                      </p:cBhvr>
+                                      <p:to>
+                                        <p:strVal val="visible"/>
+                                      </p:to>
+                                    </p:set>
+                                  </p:childTnLst>
+                                </p:cTn>
+                              </p:par>
+                            </p:childTnLst>
+                          </p:cTn>
+                        </p:par>
+                      </p:childTnLst>
+                    </p:cTn>
+                  </p:par>
+                  <p:par>
+                    <p:cTn id="15" fill="hold">
+                      <p:stCondLst>
+                        <p:cond delay="indefinite"/>
+                      </p:stCondLst>
+                      <p:childTnLst>
+                        <p:par>
+                          <p:cTn id="16" fill="hold">
+                            <p:stCondLst>
+                              <p:cond delay="0"/>
+                            </p:stCondLst>
+                            <p:childTnLst>
+                              <p:par>
+                                <p:cTn id="17" presetID="1" presetClass="entr" presetSubtype="0" fill="hold" nodeType="clickEffect">
+                                  <p:stCondLst>
+                                    <p:cond delay="0"/>
+                                  </p:stCondLst>
+                                  <p:childTnLst>
+                                    <p:set>
+                                      <p:cBhvr>
+                                        <p:cTn id="18" dur="1" fill="hold">
+                                          <p:stCondLst>
+                                            <p:cond delay="0"/>
+                                          </p:stCondLst>
+                                        </p:cTn>
+                                        <p:tgtEl>
+                                          <p:spTgt spid="3">
+                                            <p:txEl>
+                                              <p:pRg st="4" end="4"/>
+                                            </p:txEl>
+                                          </p:spTgt>
+                                        </p:tgtEl>
+                                        <p:attrNameLst>
+                                          <p:attrName>style.visibility</p:attrName>
+                                        </p:attrNameLst>
+                                      </p:cBhvr>
+                                      <p:to>
+                                        <p:strVal val="visible"/>
+                                      </p:to>
+                                    </p:set>
+                                  </p:childTnLst>
+                                </p:cTn>
+                              </p:par>
+                            </p:childTnLst>
+                          </p:cTn>
+                        </p:par>
+                      </p:childTnLst>
+                    </p:cTn>
+                  </p:par>
+                </p:childTnLst>
+              </p:cTn>
+              <p:prevCondLst>
+                <p:cond evt="onPrev" delay="0">
+                  <p:tgtEl>
+                    <p:sldTgt/>
+                  </p:tgtEl>
+                </p:cond>
+              </p:prevCondLst>
+              <p:nextCondLst>
+                <p:cond evt="onNext" delay="0">
+                  <p:tgtEl>
+                    <p:sldTgt/>
+                  </p:tgtEl>
+                </p:cond>
+              </p:nextCondLst>
+            </p:seq>
+          </p:childTnLst>
+        </p:cTn>
+      </p:par>
+    </p:tnLst>
+  </p:timing>
+</p:sld>
+</file>
+
+<file path=ppt/slides/slide6.xml><?xml version="1.0" encoding="utf-8"?>
+<p:sld xmlns:a="http://schemas.openxmlformats.org/drawingml/2006/main" xmlns:r="http://schemas.openxmlformats.org/officeDocument/2006/relationships" xmlns:p="http://schemas.openxmlformats.org/presentationml/2006/main">
+  <p:cSld>
+    <p:spTree>
+      <p:nvGrpSpPr>
+        <p:cNvPr id="1" name=""/>
+        <p:cNvGrpSpPr/>
+        <p:nvPr/>
+      </p:nvGrpSpPr>
+      <p:grpSpPr>
+        <a:xfrm>
+          <a:off x="0" y="0"/>
+          <a:ext cx="0" cy="0"/>
+          <a:chOff x="0" y="0"/>
+          <a:chExt cx="0" cy="0"/>
+        </a:xfrm>
+      </p:grpSpPr>
+      <p:sp>
+        <p:nvSpPr>
+          <p:cNvPr id="2" name="Title 1">
+            <a:extLst>
+              <a:ext uri="{FF2B5EF4-FFF2-40B4-BE49-F238E27FC236}">
+                <a16:creationId xmlns:a16="http://schemas.microsoft.com/office/drawing/2014/main" id="{68FCB9FB-AD80-444A-AAA1-AE41B2E99CBC}"/>
+              </a:ext>
+            </a:extLst>
+          </p:cNvPr>
+          <p:cNvSpPr>
+            <a:spLocks noGrp="1"/>
+          </p:cNvSpPr>
+          <p:nvPr>
+            <p:ph type="title"/>
+          </p:nvPr>
+        </p:nvSpPr>
+        <p:spPr/>
+        <p:txBody>
+          <a:bodyPr/>
+          <a:lstStyle/>
+          <a:p>
+            <a:endParaRPr lang="en-IN"/>
+          </a:p>
+        </p:txBody>
+      </p:sp>
+      <p:sp>
+        <p:nvSpPr>
+          <p:cNvPr id="3" name="Content Placeholder 2">
+            <a:extLst>
+              <a:ext uri="{FF2B5EF4-FFF2-40B4-BE49-F238E27FC236}">
+                <a16:creationId xmlns:a16="http://schemas.microsoft.com/office/drawing/2014/main" id="{7E3B6027-77B1-4051-AE66-B20811F7E279}"/>
+              </a:ext>
+            </a:extLst>
+          </p:cNvPr>
+          <p:cNvSpPr>
+            <a:spLocks noGrp="1"/>
+          </p:cNvSpPr>
+          <p:nvPr>
+            <p:ph idx="1"/>
+          </p:nvPr>
+        </p:nvSpPr>
+        <p:spPr/>
+        <p:txBody>
+          <a:bodyPr/>
+          <a:lstStyle/>
+          <a:p>
+            <a:endParaRPr lang="en-IN"/>
+          </a:p>
+        </p:txBody>
+      </p:sp>
+    </p:spTree>
+    <p:extLst>
+      <p:ext uri="{BB962C8B-B14F-4D97-AF65-F5344CB8AC3E}">
+        <p14:creationId xmlns:p14="http://schemas.microsoft.com/office/powerpoint/2010/main" val="1552177940"/>
       </p:ext>
     </p:extLst>
   </p:cSld>

</xml_diff>

<commit_message>
ppt & txt file
</commit_message>
<xml_diff>
--- a/Attendance using Facial Recognition.pptx
+++ b/Attendance using Facial Recognition.pptx
@@ -11,6 +11,7 @@
     <p:sldId id="257" r:id="rId5"/>
     <p:sldId id="258" r:id="rId6"/>
     <p:sldId id="259" r:id="rId7"/>
+    <p:sldId id="262" r:id="rId8"/>
   </p:sldIdLst>
   <p:sldSz cx="12192000" cy="6858000"/>
   <p:notesSz cx="6858000" cy="9144000"/>
@@ -167,7 +168,7 @@
           <a:noFill/>
           <a:extLst>
             <a:ext uri="{909E8E84-426E-40dd-AFC4-6F175D3DCCD1}">
-              <a14:hiddenFill xmlns="" xmlns:a14="http://schemas.microsoft.com/office/drawing/2010/main">
+              <a14:hiddenFill xmlns:a14="http://schemas.microsoft.com/office/drawing/2010/main" xmlns="">
                 <a:solidFill>
                   <a:srgbClr val="FFFFFF"/>
                 </a:solidFill>
@@ -227,7 +228,7 @@
             </a:ln>
             <a:extLst>
               <a:ext uri="{91240B29-F687-4f45-9708-019B960494DF}">
-                <a14:hiddenLine xmlns="" xmlns:a14="http://schemas.microsoft.com/office/drawing/2010/main" w="9525">
+                <a14:hiddenLine xmlns:a14="http://schemas.microsoft.com/office/drawing/2010/main" xmlns="" w="9525">
                   <a:solidFill>
                     <a:srgbClr val="000000"/>
                   </a:solidFill>
@@ -317,7 +318,7 @@
             </a:ln>
             <a:extLst>
               <a:ext uri="{91240B29-F687-4f45-9708-019B960494DF}">
-                <a14:hiddenLine xmlns="" xmlns:a14="http://schemas.microsoft.com/office/drawing/2010/main" w="9525">
+                <a14:hiddenLine xmlns:a14="http://schemas.microsoft.com/office/drawing/2010/main" xmlns="" w="9525">
                   <a:solidFill>
                     <a:srgbClr val="000000"/>
                   </a:solidFill>
@@ -407,7 +408,7 @@
             </a:ln>
             <a:extLst>
               <a:ext uri="{91240B29-F687-4f45-9708-019B960494DF}">
-                <a14:hiddenLine xmlns="" xmlns:a14="http://schemas.microsoft.com/office/drawing/2010/main" w="9525">
+                <a14:hiddenLine xmlns:a14="http://schemas.microsoft.com/office/drawing/2010/main" xmlns="" w="9525">
                   <a:solidFill>
                     <a:srgbClr val="000000"/>
                   </a:solidFill>
@@ -441,7 +442,7 @@
             </a:ln>
             <a:extLst>
               <a:ext uri="{91240B29-F687-4f45-9708-019B960494DF}">
-                <a14:hiddenLine xmlns="" xmlns:a14="http://schemas.microsoft.com/office/drawing/2010/main" w="9525">
+                <a14:hiddenLine xmlns:a14="http://schemas.microsoft.com/office/drawing/2010/main" xmlns="" w="9525">
                   <a:solidFill>
                     <a:srgbClr val="000000"/>
                   </a:solidFill>
@@ -531,7 +532,7 @@
             </a:ln>
             <a:extLst>
               <a:ext uri="{91240B29-F687-4f45-9708-019B960494DF}">
-                <a14:hiddenLine xmlns="" xmlns:a14="http://schemas.microsoft.com/office/drawing/2010/main" w="9525">
+                <a14:hiddenLine xmlns:a14="http://schemas.microsoft.com/office/drawing/2010/main" xmlns="" w="9525">
                   <a:solidFill>
                     <a:srgbClr val="000000"/>
                   </a:solidFill>
@@ -593,7 +594,7 @@
             </a:ln>
             <a:extLst>
               <a:ext uri="{91240B29-F687-4f45-9708-019B960494DF}">
-                <a14:hiddenLine xmlns="" xmlns:a14="http://schemas.microsoft.com/office/drawing/2010/main" w="9525">
+                <a14:hiddenLine xmlns:a14="http://schemas.microsoft.com/office/drawing/2010/main" xmlns="" w="9525">
                   <a:solidFill>
                     <a:srgbClr val="000000"/>
                   </a:solidFill>
@@ -655,7 +656,7 @@
             </a:ln>
             <a:extLst>
               <a:ext uri="{91240B29-F687-4f45-9708-019B960494DF}">
-                <a14:hiddenLine xmlns="" xmlns:a14="http://schemas.microsoft.com/office/drawing/2010/main" w="9525">
+                <a14:hiddenLine xmlns:a14="http://schemas.microsoft.com/office/drawing/2010/main" xmlns="" w="9525">
                   <a:solidFill>
                     <a:srgbClr val="000000"/>
                   </a:solidFill>
@@ -745,7 +746,7 @@
             </a:ln>
             <a:extLst>
               <a:ext uri="{91240B29-F687-4f45-9708-019B960494DF}">
-                <a14:hiddenLine xmlns="" xmlns:a14="http://schemas.microsoft.com/office/drawing/2010/main" w="9525">
+                <a14:hiddenLine xmlns:a14="http://schemas.microsoft.com/office/drawing/2010/main" xmlns="" w="9525">
                   <a:solidFill>
                     <a:srgbClr val="000000"/>
                   </a:solidFill>
@@ -807,7 +808,7 @@
             </a:ln>
             <a:extLst>
               <a:ext uri="{91240B29-F687-4f45-9708-019B960494DF}">
-                <a14:hiddenLine xmlns="" xmlns:a14="http://schemas.microsoft.com/office/drawing/2010/main" w="9525">
+                <a14:hiddenLine xmlns:a14="http://schemas.microsoft.com/office/drawing/2010/main" xmlns="" w="9525">
                   <a:solidFill>
                     <a:srgbClr val="000000"/>
                   </a:solidFill>
@@ -869,7 +870,7 @@
             </a:ln>
             <a:extLst>
               <a:ext uri="{91240B29-F687-4f45-9708-019B960494DF}">
-                <a14:hiddenLine xmlns="" xmlns:a14="http://schemas.microsoft.com/office/drawing/2010/main" w="9525">
+                <a14:hiddenLine xmlns:a14="http://schemas.microsoft.com/office/drawing/2010/main" xmlns="" w="9525">
                   <a:solidFill>
                     <a:srgbClr val="000000"/>
                   </a:solidFill>
@@ -959,7 +960,7 @@
             </a:ln>
             <a:extLst>
               <a:ext uri="{91240B29-F687-4f45-9708-019B960494DF}">
-                <a14:hiddenLine xmlns="" xmlns:a14="http://schemas.microsoft.com/office/drawing/2010/main" w="9525">
+                <a14:hiddenLine xmlns:a14="http://schemas.microsoft.com/office/drawing/2010/main" xmlns="" w="9525">
                   <a:solidFill>
                     <a:srgbClr val="000000"/>
                   </a:solidFill>
@@ -1049,7 +1050,7 @@
             </a:ln>
             <a:extLst>
               <a:ext uri="{91240B29-F687-4f45-9708-019B960494DF}">
-                <a14:hiddenLine xmlns="" xmlns:a14="http://schemas.microsoft.com/office/drawing/2010/main" w="9525">
+                <a14:hiddenLine xmlns:a14="http://schemas.microsoft.com/office/drawing/2010/main" xmlns="" w="9525">
                   <a:solidFill>
                     <a:srgbClr val="000000"/>
                   </a:solidFill>
@@ -1111,7 +1112,7 @@
             </a:ln>
             <a:extLst>
               <a:ext uri="{91240B29-F687-4f45-9708-019B960494DF}">
-                <a14:hiddenLine xmlns="" xmlns:a14="http://schemas.microsoft.com/office/drawing/2010/main" w="9525">
+                <a14:hiddenLine xmlns:a14="http://schemas.microsoft.com/office/drawing/2010/main" xmlns="" w="9525">
                   <a:solidFill>
                     <a:srgbClr val="000000"/>
                   </a:solidFill>
@@ -1221,7 +1222,7 @@
             </a:ln>
             <a:extLst>
               <a:ext uri="{91240B29-F687-4f45-9708-019B960494DF}">
-                <a14:hiddenLine xmlns="" xmlns:a14="http://schemas.microsoft.com/office/drawing/2010/main" w="9525">
+                <a14:hiddenLine xmlns:a14="http://schemas.microsoft.com/office/drawing/2010/main" xmlns="" w="9525">
                   <a:solidFill>
                     <a:srgbClr val="000000"/>
                   </a:solidFill>
@@ -1283,7 +1284,7 @@
             </a:ln>
             <a:extLst>
               <a:ext uri="{91240B29-F687-4f45-9708-019B960494DF}">
-                <a14:hiddenLine xmlns="" xmlns:a14="http://schemas.microsoft.com/office/drawing/2010/main" w="9525">
+                <a14:hiddenLine xmlns:a14="http://schemas.microsoft.com/office/drawing/2010/main" xmlns="" w="9525">
                   <a:solidFill>
                     <a:srgbClr val="000000"/>
                   </a:solidFill>
@@ -1373,7 +1374,7 @@
             </a:ln>
             <a:extLst>
               <a:ext uri="{91240B29-F687-4f45-9708-019B960494DF}">
-                <a14:hiddenLine xmlns="" xmlns:a14="http://schemas.microsoft.com/office/drawing/2010/main" w="9525">
+                <a14:hiddenLine xmlns:a14="http://schemas.microsoft.com/office/drawing/2010/main" xmlns="" w="9525">
                   <a:solidFill>
                     <a:srgbClr val="000000"/>
                   </a:solidFill>
@@ -1463,7 +1464,7 @@
             </a:ln>
             <a:extLst>
               <a:ext uri="{91240B29-F687-4f45-9708-019B960494DF}">
-                <a14:hiddenLine xmlns="" xmlns:a14="http://schemas.microsoft.com/office/drawing/2010/main" w="9525">
+                <a14:hiddenLine xmlns:a14="http://schemas.microsoft.com/office/drawing/2010/main" xmlns="" w="9525">
                   <a:solidFill>
                     <a:srgbClr val="000000"/>
                   </a:solidFill>
@@ -1525,7 +1526,7 @@
             </a:ln>
             <a:extLst>
               <a:ext uri="{91240B29-F687-4f45-9708-019B960494DF}">
-                <a14:hiddenLine xmlns="" xmlns:a14="http://schemas.microsoft.com/office/drawing/2010/main" w="9525">
+                <a14:hiddenLine xmlns:a14="http://schemas.microsoft.com/office/drawing/2010/main" xmlns="" w="9525">
                   <a:solidFill>
                     <a:srgbClr val="000000"/>
                   </a:solidFill>
@@ -1615,7 +1616,7 @@
             </a:ln>
             <a:extLst>
               <a:ext uri="{91240B29-F687-4f45-9708-019B960494DF}">
-                <a14:hiddenLine xmlns="" xmlns:a14="http://schemas.microsoft.com/office/drawing/2010/main" w="9525">
+                <a14:hiddenLine xmlns:a14="http://schemas.microsoft.com/office/drawing/2010/main" xmlns="" w="9525">
                   <a:solidFill>
                     <a:srgbClr val="000000"/>
                   </a:solidFill>
@@ -1705,7 +1706,7 @@
             </a:ln>
             <a:extLst>
               <a:ext uri="{91240B29-F687-4f45-9708-019B960494DF}">
-                <a14:hiddenLine xmlns="" xmlns:a14="http://schemas.microsoft.com/office/drawing/2010/main" w="9525">
+                <a14:hiddenLine xmlns:a14="http://schemas.microsoft.com/office/drawing/2010/main" xmlns="" w="9525">
                   <a:solidFill>
                     <a:srgbClr val="000000"/>
                   </a:solidFill>
@@ -1761,7 +1762,7 @@
             </a:ln>
             <a:extLst>
               <a:ext uri="{91240B29-F687-4f45-9708-019B960494DF}">
-                <a14:hiddenLine xmlns="" xmlns:a14="http://schemas.microsoft.com/office/drawing/2010/main" w="9525">
+                <a14:hiddenLine xmlns:a14="http://schemas.microsoft.com/office/drawing/2010/main" xmlns="" w="9525">
                   <a:solidFill>
                     <a:srgbClr val="000000"/>
                   </a:solidFill>
@@ -1851,7 +1852,7 @@
             </a:ln>
             <a:extLst>
               <a:ext uri="{91240B29-F687-4f45-9708-019B960494DF}">
-                <a14:hiddenLine xmlns="" xmlns:a14="http://schemas.microsoft.com/office/drawing/2010/main" w="9525">
+                <a14:hiddenLine xmlns:a14="http://schemas.microsoft.com/office/drawing/2010/main" xmlns="" w="9525">
                   <a:solidFill>
                     <a:srgbClr val="000000"/>
                   </a:solidFill>
@@ -1907,7 +1908,7 @@
             </a:ln>
             <a:extLst>
               <a:ext uri="{91240B29-F687-4f45-9708-019B960494DF}">
-                <a14:hiddenLine xmlns="" xmlns:a14="http://schemas.microsoft.com/office/drawing/2010/main" w="9525">
+                <a14:hiddenLine xmlns:a14="http://schemas.microsoft.com/office/drawing/2010/main" xmlns="" w="9525">
                   <a:solidFill>
                     <a:srgbClr val="000000"/>
                   </a:solidFill>
@@ -1997,7 +1998,7 @@
             </a:ln>
             <a:extLst>
               <a:ext uri="{91240B29-F687-4f45-9708-019B960494DF}">
-                <a14:hiddenLine xmlns="" xmlns:a14="http://schemas.microsoft.com/office/drawing/2010/main" w="9525">
+                <a14:hiddenLine xmlns:a14="http://schemas.microsoft.com/office/drawing/2010/main" xmlns="" w="9525">
                   <a:solidFill>
                     <a:srgbClr val="000000"/>
                   </a:solidFill>
@@ -2065,7 +2066,7 @@
             </a:ln>
             <a:extLst>
               <a:ext uri="{91240B29-F687-4f45-9708-019B960494DF}">
-                <a14:hiddenLine xmlns="" xmlns:a14="http://schemas.microsoft.com/office/drawing/2010/main" w="9525">
+                <a14:hiddenLine xmlns:a14="http://schemas.microsoft.com/office/drawing/2010/main" xmlns="" w="9525">
                   <a:solidFill>
                     <a:srgbClr val="000000"/>
                   </a:solidFill>
@@ -2155,7 +2156,7 @@
             </a:ln>
             <a:extLst>
               <a:ext uri="{91240B29-F687-4f45-9708-019B960494DF}">
-                <a14:hiddenLine xmlns="" xmlns:a14="http://schemas.microsoft.com/office/drawing/2010/main" w="9525">
+                <a14:hiddenLine xmlns:a14="http://schemas.microsoft.com/office/drawing/2010/main" xmlns="" w="9525">
                   <a:solidFill>
                     <a:srgbClr val="000000"/>
                   </a:solidFill>
@@ -2223,7 +2224,7 @@
             </a:ln>
             <a:extLst>
               <a:ext uri="{91240B29-F687-4f45-9708-019B960494DF}">
-                <a14:hiddenLine xmlns="" xmlns:a14="http://schemas.microsoft.com/office/drawing/2010/main" w="9525">
+                <a14:hiddenLine xmlns:a14="http://schemas.microsoft.com/office/drawing/2010/main" xmlns="" w="9525">
                   <a:solidFill>
                     <a:srgbClr val="000000"/>
                   </a:solidFill>
@@ -2313,7 +2314,7 @@
             </a:ln>
             <a:extLst>
               <a:ext uri="{91240B29-F687-4f45-9708-019B960494DF}">
-                <a14:hiddenLine xmlns="" xmlns:a14="http://schemas.microsoft.com/office/drawing/2010/main" w="9525">
+                <a14:hiddenLine xmlns:a14="http://schemas.microsoft.com/office/drawing/2010/main" xmlns="" w="9525">
                   <a:solidFill>
                     <a:srgbClr val="000000"/>
                   </a:solidFill>
@@ -2347,7 +2348,7 @@
             </a:ln>
             <a:extLst>
               <a:ext uri="{91240B29-F687-4f45-9708-019B960494DF}">
-                <a14:hiddenLine xmlns="" xmlns:a14="http://schemas.microsoft.com/office/drawing/2010/main" w="9525">
+                <a14:hiddenLine xmlns:a14="http://schemas.microsoft.com/office/drawing/2010/main" xmlns="" w="9525">
                   <a:solidFill>
                     <a:srgbClr val="000000"/>
                   </a:solidFill>
@@ -2437,7 +2438,7 @@
             </a:ln>
             <a:extLst>
               <a:ext uri="{91240B29-F687-4f45-9708-019B960494DF}">
-                <a14:hiddenLine xmlns="" xmlns:a14="http://schemas.microsoft.com/office/drawing/2010/main" w="9525">
+                <a14:hiddenLine xmlns:a14="http://schemas.microsoft.com/office/drawing/2010/main" xmlns="" w="9525">
                   <a:solidFill>
                     <a:srgbClr val="000000"/>
                   </a:solidFill>
@@ -2499,7 +2500,7 @@
             </a:ln>
             <a:extLst>
               <a:ext uri="{91240B29-F687-4f45-9708-019B960494DF}">
-                <a14:hiddenLine xmlns="" xmlns:a14="http://schemas.microsoft.com/office/drawing/2010/main" w="9525">
+                <a14:hiddenLine xmlns:a14="http://schemas.microsoft.com/office/drawing/2010/main" xmlns="" w="9525">
                   <a:solidFill>
                     <a:srgbClr val="000000"/>
                   </a:solidFill>
@@ -2561,7 +2562,7 @@
             </a:ln>
             <a:extLst>
               <a:ext uri="{91240B29-F687-4f45-9708-019B960494DF}">
-                <a14:hiddenLine xmlns="" xmlns:a14="http://schemas.microsoft.com/office/drawing/2010/main" w="9525">
+                <a14:hiddenLine xmlns:a14="http://schemas.microsoft.com/office/drawing/2010/main" xmlns="" w="9525">
                   <a:solidFill>
                     <a:srgbClr val="000000"/>
                   </a:solidFill>
@@ -2651,7 +2652,7 @@
             </a:ln>
             <a:extLst>
               <a:ext uri="{91240B29-F687-4f45-9708-019B960494DF}">
-                <a14:hiddenLine xmlns="" xmlns:a14="http://schemas.microsoft.com/office/drawing/2010/main" w="9525">
+                <a14:hiddenLine xmlns:a14="http://schemas.microsoft.com/office/drawing/2010/main" xmlns="" w="9525">
                   <a:solidFill>
                     <a:srgbClr val="000000"/>
                   </a:solidFill>
@@ -2719,7 +2720,7 @@
             </a:ln>
             <a:extLst>
               <a:ext uri="{91240B29-F687-4f45-9708-019B960494DF}">
-                <a14:hiddenLine xmlns="" xmlns:a14="http://schemas.microsoft.com/office/drawing/2010/main" w="9525">
+                <a14:hiddenLine xmlns:a14="http://schemas.microsoft.com/office/drawing/2010/main" xmlns="" w="9525">
                   <a:solidFill>
                     <a:srgbClr val="000000"/>
                   </a:solidFill>
@@ -2781,7 +2782,7 @@
             </a:ln>
             <a:extLst>
               <a:ext uri="{91240B29-F687-4f45-9708-019B960494DF}">
-                <a14:hiddenLine xmlns="" xmlns:a14="http://schemas.microsoft.com/office/drawing/2010/main" w="9525">
+                <a14:hiddenLine xmlns:a14="http://schemas.microsoft.com/office/drawing/2010/main" xmlns="" w="9525">
                   <a:solidFill>
                     <a:srgbClr val="000000"/>
                   </a:solidFill>
@@ -2871,7 +2872,7 @@
             </a:ln>
             <a:extLst>
               <a:ext uri="{91240B29-F687-4f45-9708-019B960494DF}">
-                <a14:hiddenLine xmlns="" xmlns:a14="http://schemas.microsoft.com/office/drawing/2010/main" w="9525">
+                <a14:hiddenLine xmlns:a14="http://schemas.microsoft.com/office/drawing/2010/main" xmlns="" w="9525">
                   <a:solidFill>
                     <a:srgbClr val="000000"/>
                   </a:solidFill>
@@ -2933,7 +2934,7 @@
             </a:ln>
             <a:extLst>
               <a:ext uri="{91240B29-F687-4f45-9708-019B960494DF}">
-                <a14:hiddenLine xmlns="" xmlns:a14="http://schemas.microsoft.com/office/drawing/2010/main" w="9525">
+                <a14:hiddenLine xmlns:a14="http://schemas.microsoft.com/office/drawing/2010/main" xmlns="" w="9525">
                   <a:solidFill>
                     <a:srgbClr val="000000"/>
                   </a:solidFill>
@@ -3023,7 +3024,7 @@
             </a:ln>
             <a:extLst>
               <a:ext uri="{91240B29-F687-4f45-9708-019B960494DF}">
-                <a14:hiddenLine xmlns="" xmlns:a14="http://schemas.microsoft.com/office/drawing/2010/main" w="9525">
+                <a14:hiddenLine xmlns:a14="http://schemas.microsoft.com/office/drawing/2010/main" xmlns="" w="9525">
                   <a:solidFill>
                     <a:srgbClr val="000000"/>
                   </a:solidFill>
@@ -3085,7 +3086,7 @@
             </a:ln>
             <a:extLst>
               <a:ext uri="{91240B29-F687-4f45-9708-019B960494DF}">
-                <a14:hiddenLine xmlns="" xmlns:a14="http://schemas.microsoft.com/office/drawing/2010/main" w="9525">
+                <a14:hiddenLine xmlns:a14="http://schemas.microsoft.com/office/drawing/2010/main" xmlns="" w="9525">
                   <a:solidFill>
                     <a:srgbClr val="000000"/>
                   </a:solidFill>
@@ -3175,7 +3176,7 @@
             </a:ln>
             <a:extLst>
               <a:ext uri="{91240B29-F687-4f45-9708-019B960494DF}">
-                <a14:hiddenLine xmlns="" xmlns:a14="http://schemas.microsoft.com/office/drawing/2010/main" w="9525">
+                <a14:hiddenLine xmlns:a14="http://schemas.microsoft.com/office/drawing/2010/main" xmlns="" w="9525">
                   <a:solidFill>
                     <a:srgbClr val="000000"/>
                   </a:solidFill>
@@ -3209,7 +3210,7 @@
             </a:ln>
             <a:extLst>
               <a:ext uri="{91240B29-F687-4f45-9708-019B960494DF}">
-                <a14:hiddenLine xmlns="" xmlns:a14="http://schemas.microsoft.com/office/drawing/2010/main" w="9525">
+                <a14:hiddenLine xmlns:a14="http://schemas.microsoft.com/office/drawing/2010/main" xmlns="" w="9525">
                   <a:solidFill>
                     <a:srgbClr val="000000"/>
                   </a:solidFill>
@@ -3274,7 +3275,7 @@
             </a:ln>
             <a:extLst>
               <a:ext uri="{91240B29-F687-4f45-9708-019B960494DF}">
-                <a14:hiddenLine xmlns="" xmlns:a14="http://schemas.microsoft.com/office/drawing/2010/main" w="9525">
+                <a14:hiddenLine xmlns:a14="http://schemas.microsoft.com/office/drawing/2010/main" xmlns="" w="9525">
                   <a:solidFill>
                     <a:srgbClr val="000000"/>
                   </a:solidFill>
@@ -3364,7 +3365,7 @@
             </a:ln>
             <a:extLst>
               <a:ext uri="{91240B29-F687-4f45-9708-019B960494DF}">
-                <a14:hiddenLine xmlns="" xmlns:a14="http://schemas.microsoft.com/office/drawing/2010/main" w="9525">
+                <a14:hiddenLine xmlns:a14="http://schemas.microsoft.com/office/drawing/2010/main" xmlns="" w="9525">
                   <a:solidFill>
                     <a:srgbClr val="000000"/>
                   </a:solidFill>
@@ -3426,7 +3427,7 @@
             </a:ln>
             <a:extLst>
               <a:ext uri="{91240B29-F687-4f45-9708-019B960494DF}">
-                <a14:hiddenLine xmlns="" xmlns:a14="http://schemas.microsoft.com/office/drawing/2010/main" w="9525">
+                <a14:hiddenLine xmlns:a14="http://schemas.microsoft.com/office/drawing/2010/main" xmlns="" w="9525">
                   <a:solidFill>
                     <a:srgbClr val="000000"/>
                   </a:solidFill>
@@ -3516,7 +3517,7 @@
             </a:ln>
             <a:extLst>
               <a:ext uri="{91240B29-F687-4f45-9708-019B960494DF}">
-                <a14:hiddenLine xmlns="" xmlns:a14="http://schemas.microsoft.com/office/drawing/2010/main" w="9525">
+                <a14:hiddenLine xmlns:a14="http://schemas.microsoft.com/office/drawing/2010/main" xmlns="" w="9525">
                   <a:solidFill>
                     <a:srgbClr val="000000"/>
                   </a:solidFill>
@@ -3606,7 +3607,7 @@
             </a:ln>
             <a:extLst>
               <a:ext uri="{91240B29-F687-4f45-9708-019B960494DF}">
-                <a14:hiddenLine xmlns="" xmlns:a14="http://schemas.microsoft.com/office/drawing/2010/main" w="9525">
+                <a14:hiddenLine xmlns:a14="http://schemas.microsoft.com/office/drawing/2010/main" xmlns="" w="9525">
                   <a:solidFill>
                     <a:srgbClr val="000000"/>
                   </a:solidFill>
@@ -3671,7 +3672,7 @@
             </a:ln>
             <a:extLst>
               <a:ext uri="{91240B29-F687-4f45-9708-019B960494DF}">
-                <a14:hiddenLine xmlns="" xmlns:a14="http://schemas.microsoft.com/office/drawing/2010/main" w="9525">
+                <a14:hiddenLine xmlns:a14="http://schemas.microsoft.com/office/drawing/2010/main" xmlns="" w="9525">
                   <a:solidFill>
                     <a:srgbClr val="000000"/>
                   </a:solidFill>
@@ -3733,7 +3734,7 @@
             </a:ln>
             <a:extLst>
               <a:ext uri="{91240B29-F687-4f45-9708-019B960494DF}">
-                <a14:hiddenLine xmlns="" xmlns:a14="http://schemas.microsoft.com/office/drawing/2010/main" w="9525">
+                <a14:hiddenLine xmlns:a14="http://schemas.microsoft.com/office/drawing/2010/main" xmlns="" w="9525">
                   <a:solidFill>
                     <a:srgbClr val="000000"/>
                   </a:solidFill>
@@ -3823,7 +3824,7 @@
             </a:ln>
             <a:extLst>
               <a:ext uri="{91240B29-F687-4f45-9708-019B960494DF}">
-                <a14:hiddenLine xmlns="" xmlns:a14="http://schemas.microsoft.com/office/drawing/2010/main" w="9525">
+                <a14:hiddenLine xmlns:a14="http://schemas.microsoft.com/office/drawing/2010/main" xmlns="" w="9525">
                   <a:solidFill>
                     <a:srgbClr val="000000"/>
                   </a:solidFill>
@@ -3913,7 +3914,7 @@
             </a:ln>
             <a:extLst>
               <a:ext uri="{91240B29-F687-4f45-9708-019B960494DF}">
-                <a14:hiddenLine xmlns="" xmlns:a14="http://schemas.microsoft.com/office/drawing/2010/main" w="9525">
+                <a14:hiddenLine xmlns:a14="http://schemas.microsoft.com/office/drawing/2010/main" xmlns="" w="9525">
                   <a:solidFill>
                     <a:srgbClr val="000000"/>
                   </a:solidFill>
@@ -3975,7 +3976,7 @@
             </a:ln>
             <a:extLst>
               <a:ext uri="{91240B29-F687-4f45-9708-019B960494DF}">
-                <a14:hiddenLine xmlns="" xmlns:a14="http://schemas.microsoft.com/office/drawing/2010/main" w="9525">
+                <a14:hiddenLine xmlns:a14="http://schemas.microsoft.com/office/drawing/2010/main" xmlns="" w="9525">
                   <a:solidFill>
                     <a:srgbClr val="000000"/>
                   </a:solidFill>
@@ -4095,7 +4096,7 @@
             </a:ln>
             <a:extLst>
               <a:ext uri="{91240B29-F687-4f45-9708-019B960494DF}">
-                <a14:hiddenLine xmlns="" xmlns:a14="http://schemas.microsoft.com/office/drawing/2010/main" w="9525">
+                <a14:hiddenLine xmlns:a14="http://schemas.microsoft.com/office/drawing/2010/main" xmlns="" w="9525">
                   <a:solidFill>
                     <a:srgbClr val="000000"/>
                   </a:solidFill>
@@ -4163,7 +4164,7 @@
             </a:ln>
             <a:extLst>
               <a:ext uri="{91240B29-F687-4f45-9708-019B960494DF}">
-                <a14:hiddenLine xmlns="" xmlns:a14="http://schemas.microsoft.com/office/drawing/2010/main" w="9525">
+                <a14:hiddenLine xmlns:a14="http://schemas.microsoft.com/office/drawing/2010/main" xmlns="" w="9525">
                   <a:solidFill>
                     <a:srgbClr val="000000"/>
                   </a:solidFill>
@@ -4253,7 +4254,7 @@
             </a:ln>
             <a:extLst>
               <a:ext uri="{91240B29-F687-4f45-9708-019B960494DF}">
-                <a14:hiddenLine xmlns="" xmlns:a14="http://schemas.microsoft.com/office/drawing/2010/main" w="9525">
+                <a14:hiddenLine xmlns:a14="http://schemas.microsoft.com/office/drawing/2010/main" xmlns="" w="9525">
                   <a:solidFill>
                     <a:srgbClr val="000000"/>
                   </a:solidFill>
@@ -9060,7 +9061,7 @@
           <a:noFill/>
           <a:extLst>
             <a:ext uri="{909E8E84-426E-40dd-AFC4-6F175D3DCCD1}">
-              <a14:hiddenFill xmlns="" xmlns:a14="http://schemas.microsoft.com/office/drawing/2010/main">
+              <a14:hiddenFill xmlns:a14="http://schemas.microsoft.com/office/drawing/2010/main" xmlns="">
                 <a:solidFill>
                   <a:srgbClr val="FFFFFF"/>
                 </a:solidFill>
@@ -9134,7 +9135,7 @@
               </a:ln>
               <a:extLst>
                 <a:ext uri="{91240B29-F687-4f45-9708-019B960494DF}">
-                  <a14:hiddenLine xmlns="" xmlns:a14="http://schemas.microsoft.com/office/drawing/2010/main" w="9525">
+                  <a14:hiddenLine xmlns:a14="http://schemas.microsoft.com/office/drawing/2010/main" xmlns="" w="9525">
                     <a:solidFill>
                       <a:srgbClr val="000000"/>
                     </a:solidFill>
@@ -9224,7 +9225,7 @@
               </a:ln>
               <a:extLst>
                 <a:ext uri="{91240B29-F687-4f45-9708-019B960494DF}">
-                  <a14:hiddenLine xmlns="" xmlns:a14="http://schemas.microsoft.com/office/drawing/2010/main" w="9525">
+                  <a14:hiddenLine xmlns:a14="http://schemas.microsoft.com/office/drawing/2010/main" xmlns="" w="9525">
                     <a:solidFill>
                       <a:srgbClr val="000000"/>
                     </a:solidFill>
@@ -9314,7 +9315,7 @@
               </a:ln>
               <a:extLst>
                 <a:ext uri="{91240B29-F687-4f45-9708-019B960494DF}">
-                  <a14:hiddenLine xmlns="" xmlns:a14="http://schemas.microsoft.com/office/drawing/2010/main" w="9525">
+                  <a14:hiddenLine xmlns:a14="http://schemas.microsoft.com/office/drawing/2010/main" xmlns="" w="9525">
                     <a:solidFill>
                       <a:srgbClr val="000000"/>
                     </a:solidFill>
@@ -9376,7 +9377,7 @@
               </a:ln>
               <a:extLst>
                 <a:ext uri="{91240B29-F687-4f45-9708-019B960494DF}">
-                  <a14:hiddenLine xmlns="" xmlns:a14="http://schemas.microsoft.com/office/drawing/2010/main" w="9525">
+                  <a14:hiddenLine xmlns:a14="http://schemas.microsoft.com/office/drawing/2010/main" xmlns="" w="9525">
                     <a:solidFill>
                       <a:srgbClr val="000000"/>
                     </a:solidFill>
@@ -9466,7 +9467,7 @@
               </a:ln>
               <a:extLst>
                 <a:ext uri="{91240B29-F687-4f45-9708-019B960494DF}">
-                  <a14:hiddenLine xmlns="" xmlns:a14="http://schemas.microsoft.com/office/drawing/2010/main" w="9525">
+                  <a14:hiddenLine xmlns:a14="http://schemas.microsoft.com/office/drawing/2010/main" xmlns="" w="9525">
                     <a:solidFill>
                       <a:srgbClr val="000000"/>
                     </a:solidFill>
@@ -9528,7 +9529,7 @@
               </a:ln>
               <a:extLst>
                 <a:ext uri="{91240B29-F687-4f45-9708-019B960494DF}">
-                  <a14:hiddenLine xmlns="" xmlns:a14="http://schemas.microsoft.com/office/drawing/2010/main" w="9525">
+                  <a14:hiddenLine xmlns:a14="http://schemas.microsoft.com/office/drawing/2010/main" xmlns="" w="9525">
                     <a:solidFill>
                       <a:srgbClr val="000000"/>
                     </a:solidFill>
@@ -9590,7 +9591,7 @@
               </a:ln>
               <a:extLst>
                 <a:ext uri="{91240B29-F687-4f45-9708-019B960494DF}">
-                  <a14:hiddenLine xmlns="" xmlns:a14="http://schemas.microsoft.com/office/drawing/2010/main" w="9525">
+                  <a14:hiddenLine xmlns:a14="http://schemas.microsoft.com/office/drawing/2010/main" xmlns="" w="9525">
                     <a:solidFill>
                       <a:srgbClr val="000000"/>
                     </a:solidFill>
@@ -9680,7 +9681,7 @@
               </a:ln>
               <a:extLst>
                 <a:ext uri="{91240B29-F687-4f45-9708-019B960494DF}">
-                  <a14:hiddenLine xmlns="" xmlns:a14="http://schemas.microsoft.com/office/drawing/2010/main" w="9525">
+                  <a14:hiddenLine xmlns:a14="http://schemas.microsoft.com/office/drawing/2010/main" xmlns="" w="9525">
                     <a:solidFill>
                       <a:srgbClr val="000000"/>
                     </a:solidFill>
@@ -9770,7 +9771,7 @@
               </a:ln>
               <a:extLst>
                 <a:ext uri="{91240B29-F687-4f45-9708-019B960494DF}">
-                  <a14:hiddenLine xmlns="" xmlns:a14="http://schemas.microsoft.com/office/drawing/2010/main" w="9525">
+                  <a14:hiddenLine xmlns:a14="http://schemas.microsoft.com/office/drawing/2010/main" xmlns="" w="9525">
                     <a:solidFill>
                       <a:srgbClr val="000000"/>
                     </a:solidFill>
@@ -9832,7 +9833,7 @@
               </a:ln>
               <a:extLst>
                 <a:ext uri="{91240B29-F687-4f45-9708-019B960494DF}">
-                  <a14:hiddenLine xmlns="" xmlns:a14="http://schemas.microsoft.com/office/drawing/2010/main" w="9525">
+                  <a14:hiddenLine xmlns:a14="http://schemas.microsoft.com/office/drawing/2010/main" xmlns="" w="9525">
                     <a:solidFill>
                       <a:srgbClr val="000000"/>
                     </a:solidFill>
@@ -9942,7 +9943,7 @@
               </a:ln>
               <a:extLst>
                 <a:ext uri="{91240B29-F687-4f45-9708-019B960494DF}">
-                  <a14:hiddenLine xmlns="" xmlns:a14="http://schemas.microsoft.com/office/drawing/2010/main" w="9525">
+                  <a14:hiddenLine xmlns:a14="http://schemas.microsoft.com/office/drawing/2010/main" xmlns="" w="9525">
                     <a:solidFill>
                       <a:srgbClr val="000000"/>
                     </a:solidFill>
@@ -10026,7 +10027,7 @@
               </a:ln>
               <a:extLst>
                 <a:ext uri="{91240B29-F687-4f45-9708-019B960494DF}">
-                  <a14:hiddenLine xmlns="" xmlns:a14="http://schemas.microsoft.com/office/drawing/2010/main" w="9525">
+                  <a14:hiddenLine xmlns:a14="http://schemas.microsoft.com/office/drawing/2010/main" xmlns="" w="9525">
                     <a:solidFill>
                       <a:srgbClr val="000000"/>
                     </a:solidFill>
@@ -10088,7 +10089,7 @@
               </a:ln>
               <a:extLst>
                 <a:ext uri="{91240B29-F687-4f45-9708-019B960494DF}">
-                  <a14:hiddenLine xmlns="" xmlns:a14="http://schemas.microsoft.com/office/drawing/2010/main" w="9525">
+                  <a14:hiddenLine xmlns:a14="http://schemas.microsoft.com/office/drawing/2010/main" xmlns="" w="9525">
                     <a:solidFill>
                       <a:srgbClr val="000000"/>
                     </a:solidFill>
@@ -10150,7 +10151,7 @@
               </a:ln>
               <a:extLst>
                 <a:ext uri="{91240B29-F687-4f45-9708-019B960494DF}">
-                  <a14:hiddenLine xmlns="" xmlns:a14="http://schemas.microsoft.com/office/drawing/2010/main" w="9525">
+                  <a14:hiddenLine xmlns:a14="http://schemas.microsoft.com/office/drawing/2010/main" xmlns="" w="9525">
                     <a:solidFill>
                       <a:srgbClr val="000000"/>
                     </a:solidFill>
@@ -10240,7 +10241,7 @@
               </a:ln>
               <a:extLst>
                 <a:ext uri="{91240B29-F687-4f45-9708-019B960494DF}">
-                  <a14:hiddenLine xmlns="" xmlns:a14="http://schemas.microsoft.com/office/drawing/2010/main" w="9525">
+                  <a14:hiddenLine xmlns:a14="http://schemas.microsoft.com/office/drawing/2010/main" xmlns="" w="9525">
                     <a:solidFill>
                       <a:srgbClr val="000000"/>
                     </a:solidFill>
@@ -10274,7 +10275,7 @@
               </a:ln>
               <a:extLst>
                 <a:ext uri="{91240B29-F687-4f45-9708-019B960494DF}">
-                  <a14:hiddenLine xmlns="" xmlns:a14="http://schemas.microsoft.com/office/drawing/2010/main" w="9525">
+                  <a14:hiddenLine xmlns:a14="http://schemas.microsoft.com/office/drawing/2010/main" xmlns="" w="9525">
                     <a:solidFill>
                       <a:srgbClr val="000000"/>
                     </a:solidFill>
@@ -10339,7 +10340,7 @@
               </a:ln>
               <a:extLst>
                 <a:ext uri="{91240B29-F687-4f45-9708-019B960494DF}">
-                  <a14:hiddenLine xmlns="" xmlns:a14="http://schemas.microsoft.com/office/drawing/2010/main" w="9525">
+                  <a14:hiddenLine xmlns:a14="http://schemas.microsoft.com/office/drawing/2010/main" xmlns="" w="9525">
                     <a:solidFill>
                       <a:srgbClr val="000000"/>
                     </a:solidFill>
@@ -10429,7 +10430,7 @@
               </a:ln>
               <a:extLst>
                 <a:ext uri="{91240B29-F687-4f45-9708-019B960494DF}">
-                  <a14:hiddenLine xmlns="" xmlns:a14="http://schemas.microsoft.com/office/drawing/2010/main" w="9525">
+                  <a14:hiddenLine xmlns:a14="http://schemas.microsoft.com/office/drawing/2010/main" xmlns="" w="9525">
                     <a:solidFill>
                       <a:srgbClr val="000000"/>
                     </a:solidFill>
@@ -10491,7 +10492,7 @@
               </a:ln>
               <a:extLst>
                 <a:ext uri="{91240B29-F687-4f45-9708-019B960494DF}">
-                  <a14:hiddenLine xmlns="" xmlns:a14="http://schemas.microsoft.com/office/drawing/2010/main" w="9525">
+                  <a14:hiddenLine xmlns:a14="http://schemas.microsoft.com/office/drawing/2010/main" xmlns="" w="9525">
                     <a:solidFill>
                       <a:srgbClr val="000000"/>
                     </a:solidFill>
@@ -10581,7 +10582,7 @@
               </a:ln>
               <a:extLst>
                 <a:ext uri="{91240B29-F687-4f45-9708-019B960494DF}">
-                  <a14:hiddenLine xmlns="" xmlns:a14="http://schemas.microsoft.com/office/drawing/2010/main" w="9525">
+                  <a14:hiddenLine xmlns:a14="http://schemas.microsoft.com/office/drawing/2010/main" xmlns="" w="9525">
                     <a:solidFill>
                       <a:srgbClr val="000000"/>
                     </a:solidFill>
@@ -10646,7 +10647,7 @@
               </a:ln>
               <a:extLst>
                 <a:ext uri="{91240B29-F687-4f45-9708-019B960494DF}">
-                  <a14:hiddenLine xmlns="" xmlns:a14="http://schemas.microsoft.com/office/drawing/2010/main" w="9525">
+                  <a14:hiddenLine xmlns:a14="http://schemas.microsoft.com/office/drawing/2010/main" xmlns="" w="9525">
                     <a:solidFill>
                       <a:srgbClr val="000000"/>
                     </a:solidFill>
@@ -10708,7 +10709,7 @@
               </a:ln>
               <a:extLst>
                 <a:ext uri="{91240B29-F687-4f45-9708-019B960494DF}">
-                  <a14:hiddenLine xmlns="" xmlns:a14="http://schemas.microsoft.com/office/drawing/2010/main" w="9525">
+                  <a14:hiddenLine xmlns:a14="http://schemas.microsoft.com/office/drawing/2010/main" xmlns="" w="9525">
                     <a:solidFill>
                       <a:srgbClr val="000000"/>
                     </a:solidFill>
@@ -10798,7 +10799,7 @@
               </a:ln>
               <a:extLst>
                 <a:ext uri="{91240B29-F687-4f45-9708-019B960494DF}">
-                  <a14:hiddenLine xmlns="" xmlns:a14="http://schemas.microsoft.com/office/drawing/2010/main" w="9525">
+                  <a14:hiddenLine xmlns:a14="http://schemas.microsoft.com/office/drawing/2010/main" xmlns="" w="9525">
                     <a:solidFill>
                       <a:srgbClr val="000000"/>
                     </a:solidFill>
@@ -10888,7 +10889,7 @@
               </a:ln>
               <a:extLst>
                 <a:ext uri="{91240B29-F687-4f45-9708-019B960494DF}">
-                  <a14:hiddenLine xmlns="" xmlns:a14="http://schemas.microsoft.com/office/drawing/2010/main" w="9525">
+                  <a14:hiddenLine xmlns:a14="http://schemas.microsoft.com/office/drawing/2010/main" xmlns="" w="9525">
                     <a:solidFill>
                       <a:srgbClr val="000000"/>
                     </a:solidFill>
@@ -10953,7 +10954,7 @@
               </a:ln>
               <a:extLst>
                 <a:ext uri="{91240B29-F687-4f45-9708-019B960494DF}">
-                  <a14:hiddenLine xmlns="" xmlns:a14="http://schemas.microsoft.com/office/drawing/2010/main" w="9525">
+                  <a14:hiddenLine xmlns:a14="http://schemas.microsoft.com/office/drawing/2010/main" xmlns="" w="9525">
                     <a:solidFill>
                       <a:srgbClr val="000000"/>
                     </a:solidFill>
@@ -11073,7 +11074,7 @@
               </a:ln>
               <a:extLst>
                 <a:ext uri="{91240B29-F687-4f45-9708-019B960494DF}">
-                  <a14:hiddenLine xmlns="" xmlns:a14="http://schemas.microsoft.com/office/drawing/2010/main" w="9525">
+                  <a14:hiddenLine xmlns:a14="http://schemas.microsoft.com/office/drawing/2010/main" xmlns="" w="9525">
                     <a:solidFill>
                       <a:srgbClr val="000000"/>
                     </a:solidFill>
@@ -11171,7 +11172,7 @@
               </a:ln>
               <a:extLst>
                 <a:ext uri="{91240B29-F687-4f45-9708-019B960494DF}">
-                  <a14:hiddenLine xmlns="" xmlns:a14="http://schemas.microsoft.com/office/drawing/2010/main" w="9525">
+                  <a14:hiddenLine xmlns:a14="http://schemas.microsoft.com/office/drawing/2010/main" xmlns="" w="9525">
                     <a:solidFill>
                       <a:srgbClr val="000000"/>
                     </a:solidFill>
@@ -11286,7 +11287,7 @@
               </a:ln>
               <a:extLst>
                 <a:ext uri="{91240B29-F687-4f45-9708-019B960494DF}">
-                  <a14:hiddenLine xmlns="" xmlns:a14="http://schemas.microsoft.com/office/drawing/2010/main" w="9525">
+                  <a14:hiddenLine xmlns:a14="http://schemas.microsoft.com/office/drawing/2010/main" xmlns="" w="9525">
                     <a:solidFill>
                       <a:srgbClr val="000000"/>
                     </a:solidFill>
@@ -11376,7 +11377,7 @@
               </a:ln>
               <a:extLst>
                 <a:ext uri="{91240B29-F687-4f45-9708-019B960494DF}">
-                  <a14:hiddenLine xmlns="" xmlns:a14="http://schemas.microsoft.com/office/drawing/2010/main" w="9525">
+                  <a14:hiddenLine xmlns:a14="http://schemas.microsoft.com/office/drawing/2010/main" xmlns="" w="9525">
                     <a:solidFill>
                       <a:srgbClr val="000000"/>
                     </a:solidFill>
@@ -11441,7 +11442,7 @@
               </a:ln>
               <a:extLst>
                 <a:ext uri="{91240B29-F687-4f45-9708-019B960494DF}">
-                  <a14:hiddenLine xmlns="" xmlns:a14="http://schemas.microsoft.com/office/drawing/2010/main" w="9525">
+                  <a14:hiddenLine xmlns:a14="http://schemas.microsoft.com/office/drawing/2010/main" xmlns="" w="9525">
                     <a:solidFill>
                       <a:srgbClr val="000000"/>
                     </a:solidFill>
@@ -11531,7 +11532,7 @@
               </a:ln>
               <a:extLst>
                 <a:ext uri="{91240B29-F687-4f45-9708-019B960494DF}">
-                  <a14:hiddenLine xmlns="" xmlns:a14="http://schemas.microsoft.com/office/drawing/2010/main" w="9525">
+                  <a14:hiddenLine xmlns:a14="http://schemas.microsoft.com/office/drawing/2010/main" xmlns="" w="9525">
                     <a:solidFill>
                       <a:srgbClr val="000000"/>
                     </a:solidFill>
@@ -11599,7 +11600,7 @@
               </a:ln>
               <a:extLst>
                 <a:ext uri="{91240B29-F687-4f45-9708-019B960494DF}">
-                  <a14:hiddenLine xmlns="" xmlns:a14="http://schemas.microsoft.com/office/drawing/2010/main" w="9525">
+                  <a14:hiddenLine xmlns:a14="http://schemas.microsoft.com/office/drawing/2010/main" xmlns="" w="9525">
                     <a:solidFill>
                       <a:srgbClr val="000000"/>
                     </a:solidFill>
@@ -11689,7 +11690,7 @@
               </a:ln>
               <a:extLst>
                 <a:ext uri="{91240B29-F687-4f45-9708-019B960494DF}">
-                  <a14:hiddenLine xmlns="" xmlns:a14="http://schemas.microsoft.com/office/drawing/2010/main" w="9525">
+                  <a14:hiddenLine xmlns:a14="http://schemas.microsoft.com/office/drawing/2010/main" xmlns="" w="9525">
                     <a:solidFill>
                       <a:srgbClr val="000000"/>
                     </a:solidFill>
@@ -11757,7 +11758,7 @@
               </a:ln>
               <a:extLst>
                 <a:ext uri="{91240B29-F687-4f45-9708-019B960494DF}">
-                  <a14:hiddenLine xmlns="" xmlns:a14="http://schemas.microsoft.com/office/drawing/2010/main" w="9525">
+                  <a14:hiddenLine xmlns:a14="http://schemas.microsoft.com/office/drawing/2010/main" xmlns="" w="9525">
                     <a:solidFill>
                       <a:srgbClr val="000000"/>
                     </a:solidFill>
@@ -11847,7 +11848,7 @@
               </a:ln>
               <a:extLst>
                 <a:ext uri="{91240B29-F687-4f45-9708-019B960494DF}">
-                  <a14:hiddenLine xmlns="" xmlns:a14="http://schemas.microsoft.com/office/drawing/2010/main" w="9525">
+                  <a14:hiddenLine xmlns:a14="http://schemas.microsoft.com/office/drawing/2010/main" xmlns="" w="9525">
                     <a:solidFill>
                       <a:srgbClr val="000000"/>
                     </a:solidFill>
@@ -11881,7 +11882,7 @@
               </a:ln>
               <a:extLst>
                 <a:ext uri="{91240B29-F687-4f45-9708-019B960494DF}">
-                  <a14:hiddenLine xmlns="" xmlns:a14="http://schemas.microsoft.com/office/drawing/2010/main" w="9525">
+                  <a14:hiddenLine xmlns:a14="http://schemas.microsoft.com/office/drawing/2010/main" xmlns="" w="9525">
                     <a:solidFill>
                       <a:srgbClr val="000000"/>
                     </a:solidFill>
@@ -13199,6 +13200,42 @@
           <a:chExt cx="0" cy="0"/>
         </a:xfrm>
       </p:grpSpPr>
+      <p:pic>
+        <p:nvPicPr>
+          <p:cNvPr id="5" name="Picture 4">
+            <a:extLst>
+              <a:ext uri="{FF2B5EF4-FFF2-40B4-BE49-F238E27FC236}">
+                <a16:creationId xmlns:a16="http://schemas.microsoft.com/office/drawing/2014/main" id="{E1A8018D-150D-4BCB-AFA6-F52698001E50}"/>
+              </a:ext>
+            </a:extLst>
+          </p:cNvPr>
+          <p:cNvPicPr>
+            <a:picLocks noChangeAspect="1"/>
+          </p:cNvPicPr>
+          <p:nvPr/>
+        </p:nvPicPr>
+        <p:blipFill>
+          <a:blip r:embed="rId2">
+            <a:extLst>
+              <a:ext uri="{28A0092B-C50C-407E-A947-70E740481C1C}">
+                <a14:useLocalDpi xmlns:a14="http://schemas.microsoft.com/office/drawing/2010/main" val="0"/>
+              </a:ext>
+            </a:extLst>
+          </a:blip>
+          <a:stretch>
+            <a:fillRect/>
+          </a:stretch>
+        </p:blipFill>
+        <p:spPr>
+          <a:xfrm>
+            <a:off x="3372465" y="0"/>
+            <a:ext cx="11010619" cy="6858000"/>
+          </a:xfrm>
+          <a:prstGeom prst="rect">
+            <a:avLst/>
+          </a:prstGeom>
+        </p:spPr>
+      </p:pic>
       <p:sp>
         <p:nvSpPr>
           <p:cNvPr id="2" name="Title 1">
@@ -13215,37 +13252,36 @@
             <p:ph type="title"/>
           </p:nvPr>
         </p:nvSpPr>
-        <p:spPr/>
+        <p:spPr>
+          <a:xfrm>
+            <a:off x="-102925" y="1406951"/>
+            <a:ext cx="6560286" cy="4176074"/>
+          </a:xfrm>
+        </p:spPr>
         <p:txBody>
-          <a:bodyPr/>
+          <a:bodyPr>
+            <a:normAutofit/>
+          </a:bodyPr>
           <a:lstStyle/>
           <a:p>
-            <a:endParaRPr lang="en-IN"/>
-          </a:p>
-        </p:txBody>
-      </p:sp>
-      <p:sp>
-        <p:nvSpPr>
-          <p:cNvPr id="3" name="Content Placeholder 2">
-            <a:extLst>
-              <a:ext uri="{FF2B5EF4-FFF2-40B4-BE49-F238E27FC236}">
-                <a16:creationId xmlns:a16="http://schemas.microsoft.com/office/drawing/2014/main" id="{7E3B6027-77B1-4051-AE66-B20811F7E279}"/>
-              </a:ext>
-            </a:extLst>
-          </p:cNvPr>
-          <p:cNvSpPr>
-            <a:spLocks noGrp="1"/>
-          </p:cNvSpPr>
-          <p:nvPr>
-            <p:ph idx="1"/>
-          </p:nvPr>
-        </p:nvSpPr>
-        <p:spPr/>
-        <p:txBody>
-          <a:bodyPr/>
-          <a:lstStyle/>
-          <a:p>
-            <a:endParaRPr lang="en-IN"/>
+            <a:r>
+              <a:rPr lang="en-IN" sz="7200" b="1" dirty="0"/>
+              <a:t>USAGE OF </a:t>
+            </a:r>
+            <a:br>
+              <a:rPr lang="en-IN" sz="7200" b="1" dirty="0"/>
+            </a:br>
+            <a:r>
+              <a:rPr lang="en-IN" sz="7200" b="1" dirty="0"/>
+              <a:t>Face Recognition</a:t>
+            </a:r>
+            <a:br>
+              <a:rPr lang="en-IN" sz="7200" b="1" dirty="0"/>
+            </a:br>
+            <a:r>
+              <a:rPr lang="en-IN" sz="7200" b="1" dirty="0"/>
+              <a:t>technology</a:t>
+            </a:r>
           </a:p>
         </p:txBody>
       </p:sp>
@@ -13259,6 +13295,500 @@
   <p:clrMapOvr>
     <a:masterClrMapping/>
   </p:clrMapOvr>
+</p:sld>
+</file>
+
+<file path=ppt/slides/slide7.xml><?xml version="1.0" encoding="utf-8"?>
+<p:sld xmlns:a="http://schemas.openxmlformats.org/drawingml/2006/main" xmlns:r="http://schemas.openxmlformats.org/officeDocument/2006/relationships" xmlns:p="http://schemas.openxmlformats.org/presentationml/2006/main">
+  <p:cSld>
+    <p:spTree>
+      <p:nvGrpSpPr>
+        <p:cNvPr id="1" name=""/>
+        <p:cNvGrpSpPr/>
+        <p:nvPr/>
+      </p:nvGrpSpPr>
+      <p:grpSpPr>
+        <a:xfrm>
+          <a:off x="0" y="0"/>
+          <a:ext cx="0" cy="0"/>
+          <a:chOff x="0" y="0"/>
+          <a:chExt cx="0" cy="0"/>
+        </a:xfrm>
+      </p:grpSpPr>
+      <p:sp>
+        <p:nvSpPr>
+          <p:cNvPr id="3" name="Content Placeholder 2">
+            <a:extLst>
+              <a:ext uri="{FF2B5EF4-FFF2-40B4-BE49-F238E27FC236}">
+                <a16:creationId xmlns:a16="http://schemas.microsoft.com/office/drawing/2014/main" id="{D1C5D581-7C03-4401-BCC6-53F486DDA7C8}"/>
+              </a:ext>
+            </a:extLst>
+          </p:cNvPr>
+          <p:cNvSpPr>
+            <a:spLocks noGrp="1"/>
+          </p:cNvSpPr>
+          <p:nvPr>
+            <p:ph idx="1"/>
+          </p:nvPr>
+        </p:nvSpPr>
+        <p:spPr>
+          <a:xfrm>
+            <a:off x="952108" y="1102936"/>
+            <a:ext cx="10095304" cy="4688265"/>
+          </a:xfrm>
+        </p:spPr>
+        <p:txBody>
+          <a:bodyPr>
+            <a:normAutofit/>
+          </a:bodyPr>
+          <a:lstStyle/>
+          <a:p>
+            <a:pPr>
+              <a:lnSpc>
+                <a:spcPct val="300000"/>
+              </a:lnSpc>
+            </a:pPr>
+            <a:r>
+              <a:rPr lang="en-IN" sz="3200" dirty="0"/>
+              <a:t>To verify valid users</a:t>
+            </a:r>
+          </a:p>
+          <a:p>
+            <a:pPr>
+              <a:lnSpc>
+                <a:spcPct val="300000"/>
+              </a:lnSpc>
+            </a:pPr>
+            <a:r>
+              <a:rPr lang="en-IN" sz="3200" dirty="0"/>
+              <a:t>To diagnose diseases</a:t>
+            </a:r>
+          </a:p>
+          <a:p>
+            <a:pPr>
+              <a:lnSpc>
+                <a:spcPct val="300000"/>
+              </a:lnSpc>
+            </a:pPr>
+            <a:r>
+              <a:rPr lang="en-IN" sz="3200" dirty="0"/>
+              <a:t>Control access to private areas</a:t>
+            </a:r>
+          </a:p>
+        </p:txBody>
+      </p:sp>
+      <p:pic>
+        <p:nvPicPr>
+          <p:cNvPr id="5" name="Picture 4">
+            <a:extLst>
+              <a:ext uri="{FF2B5EF4-FFF2-40B4-BE49-F238E27FC236}">
+                <a16:creationId xmlns:a16="http://schemas.microsoft.com/office/drawing/2014/main" id="{FCF1BE68-0197-412F-AD44-663DAA77EF3B}"/>
+              </a:ext>
+            </a:extLst>
+          </p:cNvPr>
+          <p:cNvPicPr>
+            <a:picLocks noChangeAspect="1"/>
+          </p:cNvPicPr>
+          <p:nvPr/>
+        </p:nvPicPr>
+        <p:blipFill>
+          <a:blip r:embed="rId2"/>
+          <a:stretch>
+            <a:fillRect/>
+          </a:stretch>
+        </p:blipFill>
+        <p:spPr>
+          <a:xfrm>
+            <a:off x="7059950" y="843726"/>
+            <a:ext cx="3467400" cy="1173582"/>
+          </a:xfrm>
+          <a:prstGeom prst="rect">
+            <a:avLst/>
+          </a:prstGeom>
+        </p:spPr>
+      </p:pic>
+      <p:pic>
+        <p:nvPicPr>
+          <p:cNvPr id="9" name="Picture 8">
+            <a:extLst>
+              <a:ext uri="{FF2B5EF4-FFF2-40B4-BE49-F238E27FC236}">
+                <a16:creationId xmlns:a16="http://schemas.microsoft.com/office/drawing/2014/main" id="{592A8EDA-C7FA-46D2-892A-F4680C767AE7}"/>
+              </a:ext>
+            </a:extLst>
+          </p:cNvPr>
+          <p:cNvPicPr>
+            <a:picLocks noChangeAspect="1"/>
+          </p:cNvPicPr>
+          <p:nvPr/>
+        </p:nvPicPr>
+        <p:blipFill>
+          <a:blip r:embed="rId3"/>
+          <a:stretch>
+            <a:fillRect/>
+          </a:stretch>
+        </p:blipFill>
+        <p:spPr>
+          <a:xfrm>
+            <a:off x="7050429" y="2249486"/>
+            <a:ext cx="3506268" cy="2350794"/>
+          </a:xfrm>
+          <a:prstGeom prst="rect">
+            <a:avLst/>
+          </a:prstGeom>
+        </p:spPr>
+      </p:pic>
+      <p:pic>
+        <p:nvPicPr>
+          <p:cNvPr id="11" name="Picture 10">
+            <a:extLst>
+              <a:ext uri="{FF2B5EF4-FFF2-40B4-BE49-F238E27FC236}">
+                <a16:creationId xmlns:a16="http://schemas.microsoft.com/office/drawing/2014/main" id="{075AC298-E000-4D41-9ED0-48ACEE2A2D5A}"/>
+              </a:ext>
+            </a:extLst>
+          </p:cNvPr>
+          <p:cNvPicPr>
+            <a:picLocks noChangeAspect="1"/>
+          </p:cNvPicPr>
+          <p:nvPr/>
+        </p:nvPicPr>
+        <p:blipFill>
+          <a:blip r:embed="rId4"/>
+          <a:stretch>
+            <a:fillRect/>
+          </a:stretch>
+        </p:blipFill>
+        <p:spPr>
+          <a:xfrm>
+            <a:off x="7050428" y="4720171"/>
+            <a:ext cx="3506267" cy="1989230"/>
+          </a:xfrm>
+          <a:prstGeom prst="rect">
+            <a:avLst/>
+          </a:prstGeom>
+        </p:spPr>
+      </p:pic>
+    </p:spTree>
+    <p:extLst>
+      <p:ext uri="{BB962C8B-B14F-4D97-AF65-F5344CB8AC3E}">
+        <p14:creationId xmlns:p14="http://schemas.microsoft.com/office/powerpoint/2010/main" val="3967264583"/>
+      </p:ext>
+    </p:extLst>
+  </p:cSld>
+  <p:clrMapOvr>
+    <a:masterClrMapping/>
+  </p:clrMapOvr>
+  <p:timing>
+    <p:tnLst>
+      <p:par>
+        <p:cTn id="1" dur="indefinite" restart="never" nodeType="tmRoot">
+          <p:childTnLst>
+            <p:seq concurrent="1" nextAc="seek">
+              <p:cTn id="2" dur="indefinite" nodeType="mainSeq">
+                <p:childTnLst>
+                  <p:par>
+                    <p:cTn id="3" fill="hold">
+                      <p:stCondLst>
+                        <p:cond delay="indefinite"/>
+                      </p:stCondLst>
+                      <p:childTnLst>
+                        <p:par>
+                          <p:cTn id="4" fill="hold">
+                            <p:stCondLst>
+                              <p:cond delay="0"/>
+                            </p:stCondLst>
+                            <p:childTnLst>
+                              <p:par>
+                                <p:cTn id="5" presetID="1" presetClass="entr" presetSubtype="0" fill="hold" nodeType="clickEffect">
+                                  <p:stCondLst>
+                                    <p:cond delay="0"/>
+                                  </p:stCondLst>
+                                  <p:childTnLst>
+                                    <p:set>
+                                      <p:cBhvr>
+                                        <p:cTn id="6" dur="1" fill="hold">
+                                          <p:stCondLst>
+                                            <p:cond delay="0"/>
+                                          </p:stCondLst>
+                                        </p:cTn>
+                                        <p:tgtEl>
+                                          <p:spTgt spid="3">
+                                            <p:txEl>
+                                              <p:pRg st="0" end="0"/>
+                                            </p:txEl>
+                                          </p:spTgt>
+                                        </p:tgtEl>
+                                        <p:attrNameLst>
+                                          <p:attrName>style.visibility</p:attrName>
+                                        </p:attrNameLst>
+                                      </p:cBhvr>
+                                      <p:to>
+                                        <p:strVal val="visible"/>
+                                      </p:to>
+                                    </p:set>
+                                  </p:childTnLst>
+                                </p:cTn>
+                              </p:par>
+                            </p:childTnLst>
+                          </p:cTn>
+                        </p:par>
+                      </p:childTnLst>
+                    </p:cTn>
+                  </p:par>
+                  <p:par>
+                    <p:cTn id="7" fill="hold">
+                      <p:stCondLst>
+                        <p:cond delay="indefinite"/>
+                      </p:stCondLst>
+                      <p:childTnLst>
+                        <p:par>
+                          <p:cTn id="8" fill="hold">
+                            <p:stCondLst>
+                              <p:cond delay="0"/>
+                            </p:stCondLst>
+                            <p:childTnLst>
+                              <p:par>
+                                <p:cTn id="9" presetID="1" presetClass="entr" presetSubtype="0" fill="hold" nodeType="clickEffect">
+                                  <p:stCondLst>
+                                    <p:cond delay="0"/>
+                                  </p:stCondLst>
+                                  <p:childTnLst>
+                                    <p:set>
+                                      <p:cBhvr>
+                                        <p:cTn id="10" dur="1" fill="hold">
+                                          <p:stCondLst>
+                                            <p:cond delay="0"/>
+                                          </p:stCondLst>
+                                        </p:cTn>
+                                        <p:tgtEl>
+                                          <p:spTgt spid="5"/>
+                                        </p:tgtEl>
+                                        <p:attrNameLst>
+                                          <p:attrName>style.visibility</p:attrName>
+                                        </p:attrNameLst>
+                                      </p:cBhvr>
+                                      <p:to>
+                                        <p:strVal val="visible"/>
+                                      </p:to>
+                                    </p:set>
+                                  </p:childTnLst>
+                                </p:cTn>
+                              </p:par>
+                            </p:childTnLst>
+                          </p:cTn>
+                        </p:par>
+                      </p:childTnLst>
+                    </p:cTn>
+                  </p:par>
+                  <p:par>
+                    <p:cTn id="11" fill="hold">
+                      <p:stCondLst>
+                        <p:cond delay="indefinite"/>
+                      </p:stCondLst>
+                      <p:childTnLst>
+                        <p:par>
+                          <p:cTn id="12" fill="hold">
+                            <p:stCondLst>
+                              <p:cond delay="0"/>
+                            </p:stCondLst>
+                            <p:childTnLst>
+                              <p:par>
+                                <p:cTn id="13" presetID="1" presetClass="entr" presetSubtype="0" fill="hold" nodeType="clickEffect">
+                                  <p:stCondLst>
+                                    <p:cond delay="0"/>
+                                  </p:stCondLst>
+                                  <p:childTnLst>
+                                    <p:set>
+                                      <p:cBhvr>
+                                        <p:cTn id="14" dur="1" fill="hold">
+                                          <p:stCondLst>
+                                            <p:cond delay="0"/>
+                                          </p:stCondLst>
+                                        </p:cTn>
+                                        <p:tgtEl>
+                                          <p:spTgt spid="3">
+                                            <p:txEl>
+                                              <p:pRg st="1" end="1"/>
+                                            </p:txEl>
+                                          </p:spTgt>
+                                        </p:tgtEl>
+                                        <p:attrNameLst>
+                                          <p:attrName>style.visibility</p:attrName>
+                                        </p:attrNameLst>
+                                      </p:cBhvr>
+                                      <p:to>
+                                        <p:strVal val="visible"/>
+                                      </p:to>
+                                    </p:set>
+                                  </p:childTnLst>
+                                </p:cTn>
+                              </p:par>
+                            </p:childTnLst>
+                          </p:cTn>
+                        </p:par>
+                      </p:childTnLst>
+                    </p:cTn>
+                  </p:par>
+                  <p:par>
+                    <p:cTn id="15" fill="hold">
+                      <p:stCondLst>
+                        <p:cond delay="indefinite"/>
+                      </p:stCondLst>
+                      <p:childTnLst>
+                        <p:par>
+                          <p:cTn id="16" fill="hold">
+                            <p:stCondLst>
+                              <p:cond delay="0"/>
+                            </p:stCondLst>
+                            <p:childTnLst>
+                              <p:par>
+                                <p:cTn id="17" presetID="1" presetClass="entr" presetSubtype="0" fill="hold" nodeType="clickEffect">
+                                  <p:stCondLst>
+                                    <p:cond delay="0"/>
+                                  </p:stCondLst>
+                                  <p:childTnLst>
+                                    <p:set>
+                                      <p:cBhvr>
+                                        <p:cTn id="18" dur="1" fill="hold">
+                                          <p:stCondLst>
+                                            <p:cond delay="0"/>
+                                          </p:stCondLst>
+                                        </p:cTn>
+                                        <p:tgtEl>
+                                          <p:spTgt spid="9"/>
+                                        </p:tgtEl>
+                                        <p:attrNameLst>
+                                          <p:attrName>style.visibility</p:attrName>
+                                        </p:attrNameLst>
+                                      </p:cBhvr>
+                                      <p:to>
+                                        <p:strVal val="visible"/>
+                                      </p:to>
+                                    </p:set>
+                                  </p:childTnLst>
+                                </p:cTn>
+                              </p:par>
+                            </p:childTnLst>
+                          </p:cTn>
+                        </p:par>
+                      </p:childTnLst>
+                    </p:cTn>
+                  </p:par>
+                  <p:par>
+                    <p:cTn id="19" fill="hold">
+                      <p:stCondLst>
+                        <p:cond delay="indefinite"/>
+                      </p:stCondLst>
+                      <p:childTnLst>
+                        <p:par>
+                          <p:cTn id="20" fill="hold">
+                            <p:stCondLst>
+                              <p:cond delay="0"/>
+                            </p:stCondLst>
+                            <p:childTnLst>
+                              <p:par>
+                                <p:cTn id="21" presetID="1" presetClass="entr" presetSubtype="0" fill="hold" nodeType="clickEffect">
+                                  <p:stCondLst>
+                                    <p:cond delay="0"/>
+                                  </p:stCondLst>
+                                  <p:childTnLst>
+                                    <p:set>
+                                      <p:cBhvr>
+                                        <p:cTn id="22" dur="1" fill="hold">
+                                          <p:stCondLst>
+                                            <p:cond delay="0"/>
+                                          </p:stCondLst>
+                                        </p:cTn>
+                                        <p:tgtEl>
+                                          <p:spTgt spid="3">
+                                            <p:txEl>
+                                              <p:pRg st="2" end="2"/>
+                                            </p:txEl>
+                                          </p:spTgt>
+                                        </p:tgtEl>
+                                        <p:attrNameLst>
+                                          <p:attrName>style.visibility</p:attrName>
+                                        </p:attrNameLst>
+                                      </p:cBhvr>
+                                      <p:to>
+                                        <p:strVal val="visible"/>
+                                      </p:to>
+                                    </p:set>
+                                  </p:childTnLst>
+                                </p:cTn>
+                              </p:par>
+                            </p:childTnLst>
+                          </p:cTn>
+                        </p:par>
+                      </p:childTnLst>
+                    </p:cTn>
+                  </p:par>
+                  <p:par>
+                    <p:cTn id="23" fill="hold">
+                      <p:stCondLst>
+                        <p:cond delay="indefinite"/>
+                      </p:stCondLst>
+                      <p:childTnLst>
+                        <p:par>
+                          <p:cTn id="24" fill="hold">
+                            <p:stCondLst>
+                              <p:cond delay="0"/>
+                            </p:stCondLst>
+                            <p:childTnLst>
+                              <p:par>
+                                <p:cTn id="25" presetID="1" presetClass="entr" presetSubtype="0" fill="hold" nodeType="clickEffect">
+                                  <p:stCondLst>
+                                    <p:cond delay="0"/>
+                                  </p:stCondLst>
+                                  <p:childTnLst>
+                                    <p:set>
+                                      <p:cBhvr>
+                                        <p:cTn id="26" dur="1" fill="hold">
+                                          <p:stCondLst>
+                                            <p:cond delay="0"/>
+                                          </p:stCondLst>
+                                        </p:cTn>
+                                        <p:tgtEl>
+                                          <p:spTgt spid="11"/>
+                                        </p:tgtEl>
+                                        <p:attrNameLst>
+                                          <p:attrName>style.visibility</p:attrName>
+                                        </p:attrNameLst>
+                                      </p:cBhvr>
+                                      <p:to>
+                                        <p:strVal val="visible"/>
+                                      </p:to>
+                                    </p:set>
+                                  </p:childTnLst>
+                                </p:cTn>
+                              </p:par>
+                            </p:childTnLst>
+                          </p:cTn>
+                        </p:par>
+                      </p:childTnLst>
+                    </p:cTn>
+                  </p:par>
+                </p:childTnLst>
+              </p:cTn>
+              <p:prevCondLst>
+                <p:cond evt="onPrev" delay="0">
+                  <p:tgtEl>
+                    <p:sldTgt/>
+                  </p:tgtEl>
+                </p:cond>
+              </p:prevCondLst>
+              <p:nextCondLst>
+                <p:cond evt="onNext" delay="0">
+                  <p:tgtEl>
+                    <p:sldTgt/>
+                  </p:tgtEl>
+                </p:cond>
+              </p:nextCondLst>
+            </p:seq>
+          </p:childTnLst>
+        </p:cTn>
+      </p:par>
+    </p:tnLst>
+  </p:timing>
 </p:sld>
 </file>
 

</xml_diff>